<commit_message>
Add GrabCut and CoreImage
</commit_message>
<xml_diff>
--- a/Hair Style Simulation Poster.pptx
+++ b/Hair Style Simulation Poster.pptx
@@ -2918,13 +2918,92 @@
       </p:grpSpPr>
       <p:sp>
         <p:nvSpPr>
+          <p:cNvPr id="7" name="矩形 6"/>
+          <p:cNvSpPr/>
+          <p:nvPr/>
+        </p:nvSpPr>
+        <p:spPr>
+          <a:xfrm>
+            <a:off x="12752773" y="5366012"/>
+            <a:ext cx="18386175" cy="1646453"/>
+          </a:xfrm>
+          <a:prstGeom prst="rect">
+            <a:avLst/>
+          </a:prstGeom>
+          <a:gradFill flip="none" rotWithShape="1">
+            <a:gsLst>
+              <a:gs pos="0">
+                <a:srgbClr val="FF0000">
+                  <a:alpha val="60000"/>
+                </a:srgbClr>
+              </a:gs>
+              <a:gs pos="31000">
+                <a:srgbClr val="FF3210">
+                  <a:alpha val="80000"/>
+                </a:srgbClr>
+              </a:gs>
+              <a:gs pos="69000">
+                <a:srgbClr val="FF0000"/>
+              </a:gs>
+              <a:gs pos="97000">
+                <a:srgbClr val="C00000"/>
+              </a:gs>
+            </a:gsLst>
+            <a:path path="circle">
+              <a:fillToRect l="50000" t="50000" r="50000" b="50000"/>
+            </a:path>
+            <a:tileRect/>
+          </a:gradFill>
+          <a:ln>
+            <a:noFill/>
+          </a:ln>
+        </p:spPr>
+        <p:style>
+          <a:lnRef idx="2">
+            <a:schemeClr val="accent1">
+              <a:shade val="50000"/>
+            </a:schemeClr>
+          </a:lnRef>
+          <a:fillRef idx="1">
+            <a:schemeClr val="accent1"/>
+          </a:fillRef>
+          <a:effectRef idx="0">
+            <a:schemeClr val="accent1"/>
+          </a:effectRef>
+          <a:fontRef idx="minor">
+            <a:schemeClr val="lt1"/>
+          </a:fontRef>
+        </p:style>
+        <p:txBody>
+          <a:bodyPr rtlCol="0" anchor="ctr"/>
+          <a:lstStyle/>
+          <a:p>
+            <a:pPr algn="ctr"/>
+            <a:r>
+              <a:rPr kumimoji="1" lang="en-US" altLang="zh-CN" sz="8000" dirty="0" smtClean="0"/>
+              <a:t>Core</a:t>
+            </a:r>
+            <a:r>
+              <a:rPr kumimoji="1" lang="zh-CN" altLang="en-US" sz="8000" dirty="0" smtClean="0"/>
+              <a:t> </a:t>
+            </a:r>
+            <a:r>
+              <a:rPr kumimoji="1" lang="en-US" altLang="zh-CN" sz="8000" dirty="0" smtClean="0"/>
+              <a:t>Technology</a:t>
+            </a:r>
+            <a:endParaRPr kumimoji="1" lang="zh-CN" altLang="en-US" sz="8000" dirty="0"/>
+          </a:p>
+        </p:txBody>
+      </p:sp>
+      <p:sp>
+        <p:nvSpPr>
           <p:cNvPr id="47" name="矩形 46"/>
           <p:cNvSpPr/>
           <p:nvPr/>
         </p:nvSpPr>
         <p:spPr>
           <a:xfrm>
-            <a:off x="0" y="0"/>
+            <a:off x="0" y="21206"/>
             <a:ext cx="43891200" cy="5029200"/>
           </a:xfrm>
           <a:prstGeom prst="rect">
@@ -3059,7 +3138,23 @@
                   <a:schemeClr val="bg1"/>
                 </a:solidFill>
               </a:rPr>
-              <a:t>Zheng, </a:t>
+              <a:t>Zheng</a:t>
+            </a:r>
+            <a:r>
+              <a:rPr kumimoji="1" lang="zh-CN" altLang="en-US" sz="2800" dirty="0">
+                <a:solidFill>
+                  <a:schemeClr val="bg1"/>
+                </a:solidFill>
+              </a:rPr>
+              <a:t> </a:t>
+            </a:r>
+            <a:r>
+              <a:rPr kumimoji="1" lang="zh-CN" altLang="en-US" sz="2800" dirty="0" smtClean="0">
+                <a:solidFill>
+                  <a:schemeClr val="bg1"/>
+                </a:solidFill>
+              </a:rPr>
+              <a:t>        </a:t>
             </a:r>
             <a:r>
               <a:rPr kumimoji="1" lang="en-US" altLang="zh-CN" sz="2800" dirty="0" err="1" smtClean="0">
@@ -3075,13 +3170,32 @@
                   <a:schemeClr val="bg1"/>
                 </a:solidFill>
               </a:rPr>
-              <a:t> Li and Yinzhu Su </a:t>
-            </a:r>
-            <a:endParaRPr kumimoji="1" lang="en-US" altLang="zh-CN" sz="2800" dirty="0" smtClean="0">
-              <a:solidFill>
-                <a:schemeClr val="bg1"/>
-              </a:solidFill>
-            </a:endParaRPr>
+              <a:t> Li</a:t>
+            </a:r>
+            <a:r>
+              <a:rPr kumimoji="1" lang="zh-CN" altLang="en-US" sz="2800" dirty="0" smtClean="0">
+                <a:solidFill>
+                  <a:schemeClr val="bg1"/>
+                </a:solidFill>
+              </a:rPr>
+              <a:t>         </a:t>
+            </a:r>
+            <a:r>
+              <a:rPr kumimoji="1" lang="en-US" altLang="zh-CN" sz="2800" dirty="0" smtClean="0">
+                <a:solidFill>
+                  <a:schemeClr val="bg1"/>
+                </a:solidFill>
+              </a:rPr>
+              <a:t>Yinzhu </a:t>
+            </a:r>
+            <a:r>
+              <a:rPr kumimoji="1" lang="en-US" altLang="zh-CN" sz="2800" dirty="0" smtClean="0">
+                <a:solidFill>
+                  <a:schemeClr val="bg1"/>
+                </a:solidFill>
+              </a:rPr>
+              <a:t>Su </a:t>
+            </a:r>
           </a:p>
           <a:p>
             <a:pPr algn="ctr"/>
@@ -3155,7 +3269,23 @@
                   <a:schemeClr val="bg1"/>
                 </a:solidFill>
               </a:rPr>
-              <a:t>Engineering,</a:t>
+              <a:t>Engineering</a:t>
+            </a:r>
+            <a:r>
+              <a:rPr kumimoji="1" lang="zh-CN" altLang="en-US" sz="2800" dirty="0" smtClean="0">
+                <a:solidFill>
+                  <a:schemeClr val="bg1"/>
+                </a:solidFill>
+              </a:rPr>
+              <a:t>      </a:t>
+            </a:r>
+            <a:r>
+              <a:rPr kumimoji="1" lang="en-US" altLang="zh-CN" sz="2800" dirty="0" smtClean="0">
+                <a:solidFill>
+                  <a:schemeClr val="bg1"/>
+                </a:solidFill>
+              </a:rPr>
+              <a:t>Boston</a:t>
             </a:r>
             <a:r>
               <a:rPr kumimoji="1" lang="zh-CN" altLang="en-US" sz="2800" dirty="0" smtClean="0">
@@ -3171,66 +3301,58 @@
                   <a:schemeClr val="bg1"/>
                 </a:solidFill>
               </a:rPr>
-              <a:t>Boston</a:t>
+              <a:t>University</a:t>
+            </a:r>
+          </a:p>
+          <a:p>
+            <a:pPr algn="ctr"/>
+            <a:r>
+              <a:rPr kumimoji="1" lang="en-US" altLang="zh-CN" sz="2800" dirty="0" smtClean="0">
+                <a:solidFill>
+                  <a:schemeClr val="bg1"/>
+                </a:solidFill>
+              </a:rPr>
+              <a:t>zhengx95@bu.edu</a:t>
             </a:r>
             <a:r>
               <a:rPr kumimoji="1" lang="zh-CN" altLang="en-US" sz="2800" dirty="0" smtClean="0">
+                <a:solidFill>
+                  <a:schemeClr val="bg1"/>
+                </a:solidFill>
+              </a:rPr>
+              <a:t>         </a:t>
+            </a:r>
+            <a:r>
+              <a:rPr kumimoji="1" lang="en-US" altLang="zh-CN" sz="2800" dirty="0" err="1" smtClean="0">
+                <a:solidFill>
+                  <a:schemeClr val="bg1"/>
+                </a:solidFill>
+              </a:rPr>
+              <a:t>zrli@bu.edu</a:t>
+            </a:r>
+            <a:r>
+              <a:rPr kumimoji="1" lang="zh-CN" altLang="en-US" sz="2800" dirty="0" smtClean="0">
+                <a:solidFill>
+                  <a:schemeClr val="bg1"/>
+                </a:solidFill>
+              </a:rPr>
+              <a:t>         </a:t>
+            </a:r>
+            <a:r>
+              <a:rPr kumimoji="1" lang="en-US" altLang="zh-CN" sz="2800" dirty="0" err="1" smtClean="0">
+                <a:solidFill>
+                  <a:schemeClr val="bg1"/>
+                </a:solidFill>
+              </a:rPr>
+              <a:t>yzsu@bu.edu</a:t>
+            </a:r>
+            <a:r>
+              <a:rPr kumimoji="1" lang="en-US" altLang="zh-CN" sz="2800" dirty="0" smtClean="0">
                 <a:solidFill>
                   <a:schemeClr val="bg1"/>
                 </a:solidFill>
               </a:rPr>
               <a:t> </a:t>
-            </a:r>
-            <a:r>
-              <a:rPr kumimoji="1" lang="en-US" altLang="zh-CN" sz="2800" dirty="0" smtClean="0">
-                <a:solidFill>
-                  <a:schemeClr val="bg1"/>
-                </a:solidFill>
-              </a:rPr>
-              <a:t>University</a:t>
-            </a:r>
-          </a:p>
-          <a:p>
-            <a:pPr algn="ctr"/>
-            <a:r>
-              <a:rPr kumimoji="1" lang="zh-CN" altLang="en-US" sz="2800" dirty="0" smtClean="0">
-                <a:solidFill>
-                  <a:schemeClr val="bg1"/>
-                </a:solidFill>
-              </a:rPr>
-              <a:t>郑翔的邮箱</a:t>
-            </a:r>
-            <a:r>
-              <a:rPr kumimoji="1" lang="en-US" altLang="zh-CN" sz="2800" dirty="0" smtClean="0">
-                <a:solidFill>
-                  <a:schemeClr val="bg1"/>
-                </a:solidFill>
-              </a:rPr>
-              <a:t>,</a:t>
-            </a:r>
-            <a:r>
-              <a:rPr kumimoji="1" lang="zh-CN" altLang="en-US" sz="2800" dirty="0" smtClean="0">
-                <a:solidFill>
-                  <a:schemeClr val="bg1"/>
-                </a:solidFill>
-              </a:rPr>
-              <a:t> </a:t>
-            </a:r>
-            <a:r>
-              <a:rPr kumimoji="1" lang="en-US" altLang="zh-CN" sz="2800" dirty="0" smtClean="0">
-                <a:solidFill>
-                  <a:schemeClr val="bg1"/>
-                </a:solidFill>
-              </a:rPr>
-              <a:t>zrli@bu.edu</a:t>
-            </a:r>
-            <a:r>
-              <a:rPr kumimoji="1" lang="zh-CN" altLang="en-US" sz="2800" dirty="0" smtClean="0">
-                <a:solidFill>
-                  <a:schemeClr val="bg1"/>
-                </a:solidFill>
-              </a:rPr>
-              <a:t>， 老苏的邮箱</a:t>
             </a:r>
             <a:endParaRPr kumimoji="1" lang="zh-CN" altLang="en-US" sz="2800" dirty="0">
               <a:solidFill>
@@ -3242,6 +3364,52 @@
       </p:sp>
       <p:sp>
         <p:nvSpPr>
+          <p:cNvPr id="23" name="矩形 22"/>
+          <p:cNvSpPr/>
+          <p:nvPr/>
+        </p:nvSpPr>
+        <p:spPr>
+          <a:xfrm>
+            <a:off x="35366674" y="1070342"/>
+            <a:ext cx="5578126" cy="2594083"/>
+          </a:xfrm>
+          <a:prstGeom prst="rect">
+            <a:avLst/>
+          </a:prstGeom>
+          <a:solidFill>
+            <a:schemeClr val="bg1"/>
+          </a:solidFill>
+          <a:ln>
+            <a:noFill/>
+          </a:ln>
+        </p:spPr>
+        <p:style>
+          <a:lnRef idx="2">
+            <a:schemeClr val="accent1">
+              <a:shade val="50000"/>
+            </a:schemeClr>
+          </a:lnRef>
+          <a:fillRef idx="1">
+            <a:schemeClr val="accent1"/>
+          </a:fillRef>
+          <a:effectRef idx="0">
+            <a:schemeClr val="accent1"/>
+          </a:effectRef>
+          <a:fontRef idx="minor">
+            <a:schemeClr val="lt1"/>
+          </a:fontRef>
+        </p:style>
+        <p:txBody>
+          <a:bodyPr rtlCol="0" anchor="ctr"/>
+          <a:lstStyle/>
+          <a:p>
+            <a:pPr algn="ctr"/>
+            <a:endParaRPr kumimoji="1" lang="zh-CN" altLang="en-US"/>
+          </a:p>
+        </p:txBody>
+      </p:sp>
+      <p:sp>
+        <p:nvSpPr>
           <p:cNvPr id="8" name="标题 1"/>
           <p:cNvSpPr txBox="1">
             <a:spLocks/>
@@ -3250,7 +3418,7 @@
         </p:nvSpPr>
         <p:spPr>
           <a:xfrm>
-            <a:off x="3386197" y="5585495"/>
+            <a:off x="580312" y="5585495"/>
             <a:ext cx="5514341" cy="1239798"/>
           </a:xfrm>
           <a:prstGeom prst="rect">
@@ -3319,7 +3487,7 @@
         </p:blipFill>
         <p:spPr>
           <a:xfrm>
-            <a:off x="11254741" y="5585495"/>
+            <a:off x="8726600" y="5585495"/>
             <a:ext cx="3007793" cy="5805165"/>
           </a:xfrm>
           <a:prstGeom prst="rect">
@@ -3349,134 +3517,164 @@
         </p:blipFill>
         <p:spPr>
           <a:xfrm>
-            <a:off x="11267376" y="12523032"/>
-            <a:ext cx="2995158" cy="5780778"/>
+            <a:off x="8739235" y="12523032"/>
+            <a:ext cx="2995157" cy="5780778"/>
           </a:xfrm>
           <a:prstGeom prst="rect">
             <a:avLst/>
           </a:prstGeom>
         </p:spPr>
       </p:pic>
-      <p:pic>
-        <p:nvPicPr>
-          <p:cNvPr id="20" name="图片 19"/>
-          <p:cNvPicPr>
-            <a:picLocks noChangeAspect="1"/>
-          </p:cNvPicPr>
+      <p:grpSp>
+        <p:nvGrpSpPr>
+          <p:cNvPr id="27" name="组 26"/>
+          <p:cNvGrpSpPr/>
           <p:nvPr/>
-        </p:nvPicPr>
-        <p:blipFill>
-          <a:blip r:embed="rId4">
-            <a:extLst>
-              <a:ext uri="{28A0092B-C50C-407E-A947-70E740481C1C}">
-                <a14:useLocalDpi xmlns:a14="http://schemas.microsoft.com/office/drawing/2010/main" val="0"/>
-              </a:ext>
-            </a:extLst>
-          </a:blip>
-          <a:stretch>
-            <a:fillRect/>
-          </a:stretch>
-        </p:blipFill>
-        <p:spPr>
+        </p:nvGrpSpPr>
+        <p:grpSpPr>
           <a:xfrm>
-            <a:off x="666775" y="30646910"/>
-            <a:ext cx="1564640" cy="1564640"/>
+            <a:off x="35889333" y="1285840"/>
+            <a:ext cx="2202830" cy="2427160"/>
+            <a:chOff x="102808" y="30646910"/>
+            <a:chExt cx="2202830" cy="2427160"/>
           </a:xfrm>
-          <a:prstGeom prst="rect">
-            <a:avLst/>
-          </a:prstGeom>
-        </p:spPr>
-      </p:pic>
-      <p:pic>
-        <p:nvPicPr>
-          <p:cNvPr id="21" name="图片 20"/>
-          <p:cNvPicPr>
-            <a:picLocks noChangeAspect="1"/>
-          </p:cNvPicPr>
+        </p:grpSpPr>
+        <p:pic>
+          <p:nvPicPr>
+            <p:cNvPr id="20" name="图片 19"/>
+            <p:cNvPicPr>
+              <a:picLocks noChangeAspect="1"/>
+            </p:cNvPicPr>
+            <p:nvPr/>
+          </p:nvPicPr>
+          <p:blipFill>
+            <a:blip r:embed="rId4">
+              <a:extLst>
+                <a:ext uri="{28A0092B-C50C-407E-A947-70E740481C1C}">
+                  <a14:useLocalDpi xmlns:a14="http://schemas.microsoft.com/office/drawing/2010/main" val="0"/>
+                </a:ext>
+              </a:extLst>
+            </a:blip>
+            <a:stretch>
+              <a:fillRect/>
+            </a:stretch>
+          </p:blipFill>
+          <p:spPr>
+            <a:xfrm>
+              <a:off x="347680" y="30646910"/>
+              <a:ext cx="1564640" cy="1564640"/>
+            </a:xfrm>
+            <a:prstGeom prst="rect">
+              <a:avLst/>
+            </a:prstGeom>
+          </p:spPr>
+        </p:pic>
+        <p:sp>
+          <p:nvSpPr>
+            <p:cNvPr id="16" name="文本框 15"/>
+            <p:cNvSpPr txBox="1"/>
+            <p:nvPr/>
+          </p:nvSpPr>
+          <p:spPr>
+            <a:xfrm>
+              <a:off x="102808" y="32099059"/>
+              <a:ext cx="2202830" cy="975011"/>
+            </a:xfrm>
+            <a:prstGeom prst="rect">
+              <a:avLst/>
+            </a:prstGeom>
+            <a:noFill/>
+          </p:spPr>
+          <p:txBody>
+            <a:bodyPr wrap="square" rtlCol="0">
+              <a:spAutoFit/>
+            </a:bodyPr>
+            <a:lstStyle/>
+            <a:p>
+              <a:r>
+                <a:rPr kumimoji="1" lang="en-US" altLang="zh-CN" dirty="0" err="1" smtClean="0"/>
+                <a:t>Github</a:t>
+              </a:r>
+              <a:endParaRPr kumimoji="1" lang="zh-CN" altLang="en-US" dirty="0"/>
+            </a:p>
+          </p:txBody>
+        </p:sp>
+      </p:grpSp>
+      <p:grpSp>
+        <p:nvGrpSpPr>
+          <p:cNvPr id="55" name="组 54"/>
+          <p:cNvGrpSpPr/>
           <p:nvPr/>
-        </p:nvPicPr>
-        <p:blipFill>
-          <a:blip r:embed="rId5">
-            <a:extLst>
-              <a:ext uri="{28A0092B-C50C-407E-A947-70E740481C1C}">
-                <a14:useLocalDpi xmlns:a14="http://schemas.microsoft.com/office/drawing/2010/main" val="0"/>
-              </a:ext>
-            </a:extLst>
-          </a:blip>
-          <a:stretch>
-            <a:fillRect/>
-          </a:stretch>
-        </p:blipFill>
-        <p:spPr>
+        </p:nvGrpSpPr>
+        <p:grpSpPr>
           <a:xfrm>
-            <a:off x="41996387" y="30630940"/>
-            <a:ext cx="1583746" cy="1583746"/>
+            <a:off x="38407441" y="1267310"/>
+            <a:ext cx="1908531" cy="2464220"/>
+            <a:chOff x="41710820" y="30646910"/>
+            <a:chExt cx="1908531" cy="2464220"/>
           </a:xfrm>
-          <a:prstGeom prst="rect">
-            <a:avLst/>
-          </a:prstGeom>
-        </p:spPr>
-      </p:pic>
-      <p:sp>
-        <p:nvSpPr>
-          <p:cNvPr id="16" name="文本框 15"/>
-          <p:cNvSpPr txBox="1"/>
-          <p:nvPr/>
-        </p:nvSpPr>
-        <p:spPr>
-          <a:xfrm>
-            <a:off x="347680" y="32052856"/>
-            <a:ext cx="2202830" cy="975011"/>
-          </a:xfrm>
-          <a:prstGeom prst="rect">
-            <a:avLst/>
-          </a:prstGeom>
-          <a:noFill/>
-        </p:spPr>
-        <p:txBody>
-          <a:bodyPr wrap="square" rtlCol="0">
-            <a:spAutoFit/>
-          </a:bodyPr>
-          <a:lstStyle/>
-          <a:p>
-            <a:r>
-              <a:rPr kumimoji="1" lang="en-US" altLang="zh-CN" dirty="0" err="1" smtClean="0"/>
-              <a:t>Github</a:t>
-            </a:r>
-            <a:endParaRPr kumimoji="1" lang="zh-CN" altLang="en-US" dirty="0"/>
-          </a:p>
-        </p:txBody>
-      </p:sp>
-      <p:sp>
-        <p:nvSpPr>
-          <p:cNvPr id="18" name="文本框 17"/>
-          <p:cNvSpPr txBox="1"/>
-          <p:nvPr/>
-        </p:nvSpPr>
-        <p:spPr>
-          <a:xfrm>
-            <a:off x="41833994" y="32099060"/>
-            <a:ext cx="1908531" cy="975011"/>
-          </a:xfrm>
-          <a:prstGeom prst="rect">
-            <a:avLst/>
-          </a:prstGeom>
-          <a:noFill/>
-        </p:spPr>
-        <p:txBody>
-          <a:bodyPr wrap="square" rtlCol="0">
-            <a:spAutoFit/>
-          </a:bodyPr>
-          <a:lstStyle/>
-          <a:p>
-            <a:r>
-              <a:rPr kumimoji="1" lang="en-US" altLang="zh-CN" dirty="0" smtClean="0"/>
-              <a:t>Trello</a:t>
-            </a:r>
-            <a:endParaRPr kumimoji="1" lang="zh-CN" altLang="en-US" dirty="0"/>
-          </a:p>
-        </p:txBody>
-      </p:sp>
+        </p:grpSpPr>
+        <p:pic>
+          <p:nvPicPr>
+            <p:cNvPr id="21" name="图片 20"/>
+            <p:cNvPicPr>
+              <a:picLocks noChangeAspect="1"/>
+            </p:cNvPicPr>
+            <p:nvPr/>
+          </p:nvPicPr>
+          <p:blipFill>
+            <a:blip r:embed="rId5">
+              <a:extLst>
+                <a:ext uri="{28A0092B-C50C-407E-A947-70E740481C1C}">
+                  <a14:useLocalDpi xmlns:a14="http://schemas.microsoft.com/office/drawing/2010/main" val="0"/>
+                </a:ext>
+              </a:extLst>
+            </a:blip>
+            <a:stretch>
+              <a:fillRect/>
+            </a:stretch>
+          </p:blipFill>
+          <p:spPr>
+            <a:xfrm>
+              <a:off x="41873213" y="30646910"/>
+              <a:ext cx="1583746" cy="1583746"/>
+            </a:xfrm>
+            <a:prstGeom prst="rect">
+              <a:avLst/>
+            </a:prstGeom>
+          </p:spPr>
+        </p:pic>
+        <p:sp>
+          <p:nvSpPr>
+            <p:cNvPr id="18" name="文本框 17"/>
+            <p:cNvSpPr txBox="1"/>
+            <p:nvPr/>
+          </p:nvSpPr>
+          <p:spPr>
+            <a:xfrm>
+              <a:off x="41710820" y="32136119"/>
+              <a:ext cx="1908531" cy="975011"/>
+            </a:xfrm>
+            <a:prstGeom prst="rect">
+              <a:avLst/>
+            </a:prstGeom>
+            <a:noFill/>
+          </p:spPr>
+          <p:txBody>
+            <a:bodyPr wrap="square" rtlCol="0">
+              <a:spAutoFit/>
+            </a:bodyPr>
+            <a:lstStyle/>
+            <a:p>
+              <a:r>
+                <a:rPr kumimoji="1" lang="en-US" altLang="zh-CN" dirty="0" smtClean="0"/>
+                <a:t>Trello</a:t>
+              </a:r>
+              <a:endParaRPr kumimoji="1" lang="zh-CN" altLang="en-US" dirty="0"/>
+            </a:p>
+          </p:txBody>
+        </p:sp>
+      </p:grpSp>
       <p:sp>
         <p:nvSpPr>
           <p:cNvPr id="22" name="标题 1"/>
@@ -3487,7 +3685,7 @@
         </p:nvSpPr>
         <p:spPr>
           <a:xfrm>
-            <a:off x="3965303" y="12523032"/>
+            <a:off x="616461" y="12452976"/>
             <a:ext cx="3637280" cy="1239798"/>
           </a:xfrm>
           <a:prstGeom prst="rect">
@@ -3542,7 +3740,7 @@
         </p:nvSpPr>
         <p:spPr>
           <a:xfrm>
-            <a:off x="1763486" y="6531429"/>
+            <a:off x="580312" y="7099126"/>
             <a:ext cx="8759765" cy="5388398"/>
           </a:xfrm>
           <a:prstGeom prst="rect">
@@ -3614,7 +3812,15 @@
             </a:r>
             <a:r>
               <a:rPr lang="en-US" altLang="zh-CN" dirty="0" smtClean="0"/>
-              <a:t>old,</a:t>
+              <a:t>old</a:t>
+            </a:r>
+            <a:r>
+              <a:rPr lang="zh-CN" altLang="en-US" dirty="0" smtClean="0"/>
+              <a:t> </a:t>
+            </a:r>
+            <a:r>
+              <a:rPr lang="en-US" altLang="zh-CN" dirty="0" smtClean="0"/>
+              <a:t>one,</a:t>
             </a:r>
             <a:r>
               <a:rPr lang="zh-CN" altLang="en-US" dirty="0" smtClean="0"/>
@@ -3642,7 +3848,7 @@
         </p:nvSpPr>
         <p:spPr>
           <a:xfrm>
-            <a:off x="1763486" y="13552714"/>
+            <a:off x="616461" y="13828669"/>
             <a:ext cx="8040914" cy="4505721"/>
           </a:xfrm>
           <a:prstGeom prst="rect">
@@ -3758,7 +3964,7 @@
         </p:nvSpPr>
         <p:spPr>
           <a:xfrm>
-            <a:off x="3916823" y="19535475"/>
+            <a:off x="616461" y="19675535"/>
             <a:ext cx="3637280" cy="1239798"/>
           </a:xfrm>
           <a:prstGeom prst="rect">
@@ -3795,7 +4001,7 @@
                   <a:srgbClr val="FF0000"/>
                 </a:solidFill>
               </a:rPr>
-              <a:t>Grabcut</a:t>
+              <a:t>GrabCut</a:t>
             </a:r>
             <a:endParaRPr kumimoji="1" lang="zh-CN" altLang="en-US" sz="8000" b="1" dirty="0">
               <a:solidFill>
@@ -3813,7 +4019,7 @@
         </p:nvSpPr>
         <p:spPr>
           <a:xfrm>
-            <a:off x="1763486" y="20775273"/>
+            <a:off x="616461" y="21051228"/>
             <a:ext cx="8040914" cy="2740366"/>
           </a:xfrm>
           <a:prstGeom prst="rect">
@@ -3832,11 +4038,11 @@
               <a:buChar char="•"/>
             </a:pPr>
             <a:r>
-              <a:rPr lang="en-US" altLang="zh-CN" dirty="0" err="1"/>
-              <a:t>Grabcut</a:t>
-            </a:r>
-            <a:r>
-              <a:rPr lang="zh-CN" altLang="en-US" dirty="0"/>
+              <a:rPr lang="en-US" altLang="zh-CN" dirty="0" err="1" smtClean="0"/>
+              <a:t>GrabCut</a:t>
+            </a:r>
+            <a:r>
+              <a:rPr lang="zh-CN" altLang="en-US" dirty="0" smtClean="0"/>
               <a:t> </a:t>
             </a:r>
             <a:r>
@@ -3878,7 +4084,7 @@
         </p:blipFill>
         <p:spPr>
           <a:xfrm>
-            <a:off x="11254741" y="19535475"/>
+            <a:off x="8726600" y="19535475"/>
             <a:ext cx="2973362" cy="5745519"/>
           </a:xfrm>
           <a:prstGeom prst="rect">
@@ -3894,7 +4100,7 @@
         </p:nvSpPr>
         <p:spPr>
           <a:xfrm>
-            <a:off x="12606403" y="11545737"/>
+            <a:off x="10129062" y="11545737"/>
             <a:ext cx="304468" cy="822217"/>
           </a:xfrm>
           <a:prstGeom prst="downArrow">
@@ -3942,7 +4148,7 @@
         </p:nvSpPr>
         <p:spPr>
           <a:xfrm>
-            <a:off x="12606403" y="18529699"/>
+            <a:off x="10129062" y="18529699"/>
             <a:ext cx="304468" cy="822217"/>
           </a:xfrm>
           <a:prstGeom prst="downArrow">
@@ -4004,7 +4210,7 @@
         </p:blipFill>
         <p:spPr>
           <a:xfrm>
-            <a:off x="11254741" y="26390600"/>
+            <a:off x="33041201" y="19551056"/>
             <a:ext cx="2973362" cy="5745519"/>
           </a:xfrm>
           <a:prstGeom prst="rect">
@@ -4022,7 +4228,7 @@
         </p:nvSpPr>
         <p:spPr>
           <a:xfrm>
-            <a:off x="2306463" y="26232477"/>
+            <a:off x="36128415" y="19644326"/>
             <a:ext cx="6858000" cy="1324596"/>
           </a:xfrm>
           <a:prstGeom prst="rect">
@@ -4075,7 +4281,15 @@
                   <a:srgbClr val="FF0000"/>
                 </a:solidFill>
               </a:rPr>
-              <a:t>hairstyle</a:t>
+              <a:t>H</a:t>
+            </a:r>
+            <a:r>
+              <a:rPr kumimoji="1" lang="en-US" altLang="zh-CN" sz="8000" b="1" dirty="0" smtClean="0">
+                <a:solidFill>
+                  <a:srgbClr val="FF0000"/>
+                </a:solidFill>
+              </a:rPr>
+              <a:t>airstyles</a:t>
             </a:r>
             <a:endParaRPr kumimoji="1" lang="zh-CN" altLang="en-US" sz="8000" b="1" dirty="0">
               <a:solidFill>
@@ -4093,8 +4307,8 @@
         </p:nvSpPr>
         <p:spPr>
           <a:xfrm>
-            <a:off x="1715006" y="27529746"/>
-            <a:ext cx="8040914" cy="975011"/>
+            <a:off x="36265119" y="21051228"/>
+            <a:ext cx="8040914" cy="1857688"/>
           </a:xfrm>
           <a:prstGeom prst="rect">
             <a:avLst/>
@@ -4124,86 +4338,43 @@
               <a:t>selection</a:t>
             </a:r>
           </a:p>
-        </p:txBody>
-      </p:sp>
-      <p:sp>
-        <p:nvSpPr>
-          <p:cNvPr id="36" name="下箭头 35"/>
-          <p:cNvSpPr/>
-          <p:nvPr/>
-        </p:nvSpPr>
-        <p:spPr>
-          <a:xfrm>
-            <a:off x="12555603" y="25387699"/>
-            <a:ext cx="304468" cy="822217"/>
-          </a:xfrm>
-          <a:prstGeom prst="downArrow">
-            <a:avLst/>
-          </a:prstGeom>
-          <a:solidFill>
-            <a:srgbClr val="FF0000"/>
-          </a:solidFill>
-          <a:ln>
-            <a:solidFill>
-              <a:srgbClr val="FF0000"/>
-            </a:solidFill>
-          </a:ln>
-        </p:spPr>
-        <p:style>
-          <a:lnRef idx="2">
-            <a:schemeClr val="accent1">
-              <a:shade val="50000"/>
-            </a:schemeClr>
-          </a:lnRef>
-          <a:fillRef idx="1">
-            <a:schemeClr val="accent1"/>
-          </a:fillRef>
-          <a:effectRef idx="0">
-            <a:schemeClr val="accent1"/>
-          </a:effectRef>
-          <a:fontRef idx="minor">
-            <a:schemeClr val="lt1"/>
-          </a:fontRef>
-        </p:style>
-        <p:txBody>
-          <a:bodyPr rtlCol="0" anchor="ctr"/>
-          <a:lstStyle/>
-          <a:p>
-            <a:pPr algn="ctr"/>
-            <a:endParaRPr kumimoji="1" lang="zh-CN" altLang="en-US"/>
-          </a:p>
-        </p:txBody>
-      </p:sp>
-      <p:pic>
-        <p:nvPicPr>
-          <p:cNvPr id="37" name="图片 36"/>
-          <p:cNvPicPr>
-            <a:picLocks noChangeAspect="1"/>
-          </p:cNvPicPr>
-          <p:nvPr/>
-        </p:nvPicPr>
-        <p:blipFill>
-          <a:blip r:embed="rId9">
-            <a:extLst>
-              <a:ext uri="{28A0092B-C50C-407E-A947-70E740481C1C}">
-                <a14:useLocalDpi xmlns:a14="http://schemas.microsoft.com/office/drawing/2010/main" val="0"/>
-              </a:ext>
-            </a:extLst>
-          </a:blip>
-          <a:stretch>
-            <a:fillRect/>
-          </a:stretch>
-        </p:blipFill>
-        <p:spPr>
-          <a:xfrm>
-            <a:off x="32126309" y="26462973"/>
-            <a:ext cx="2974944" cy="5748577"/>
-          </a:xfrm>
-          <a:prstGeom prst="rect">
-            <a:avLst/>
-          </a:prstGeom>
-        </p:spPr>
-      </p:pic>
+          <a:p>
+            <a:pPr marL="857250" indent="-857250">
+              <a:buFont typeface="Arial" charset="0"/>
+              <a:buChar char="•"/>
+            </a:pPr>
+            <a:r>
+              <a:rPr lang="en-US" altLang="zh-CN" dirty="0" smtClean="0"/>
+              <a:t>10</a:t>
+            </a:r>
+            <a:r>
+              <a:rPr lang="zh-CN" altLang="en-US" dirty="0" smtClean="0"/>
+              <a:t> </a:t>
+            </a:r>
+            <a:r>
+              <a:rPr lang="en-US" altLang="zh-CN" dirty="0" smtClean="0"/>
+              <a:t>hairstyles</a:t>
+            </a:r>
+            <a:r>
+              <a:rPr lang="zh-CN" altLang="en-US" dirty="0" smtClean="0"/>
+              <a:t> </a:t>
+            </a:r>
+            <a:r>
+              <a:rPr lang="en-US" altLang="zh-CN" dirty="0" smtClean="0"/>
+              <a:t>till</a:t>
+            </a:r>
+            <a:r>
+              <a:rPr lang="zh-CN" altLang="en-US" dirty="0" smtClean="0"/>
+              <a:t> </a:t>
+            </a:r>
+            <a:r>
+              <a:rPr lang="en-US" altLang="zh-CN" dirty="0" smtClean="0"/>
+              <a:t>now</a:t>
+            </a:r>
+            <a:endParaRPr lang="en-US" altLang="zh-CN" dirty="0" smtClean="0"/>
+          </a:p>
+        </p:txBody>
+      </p:sp>
       <p:sp>
         <p:nvSpPr>
           <p:cNvPr id="38" name="右箭头 37"/>
@@ -4212,8 +4383,8 @@
         </p:nvSpPr>
         <p:spPr>
           <a:xfrm>
-            <a:off x="14637159" y="31641989"/>
-            <a:ext cx="17080094" cy="410867"/>
+            <a:off x="11930581" y="24780504"/>
+            <a:ext cx="20880000" cy="410867"/>
           </a:xfrm>
           <a:prstGeom prst="rightArrow">
             <a:avLst/>
@@ -4252,6 +4423,36 @@
           </a:p>
         </p:txBody>
       </p:sp>
+      <p:pic>
+        <p:nvPicPr>
+          <p:cNvPr id="37" name="图片 36"/>
+          <p:cNvPicPr>
+            <a:picLocks noChangeAspect="1"/>
+          </p:cNvPicPr>
+          <p:nvPr/>
+        </p:nvPicPr>
+        <p:blipFill>
+          <a:blip r:embed="rId9">
+            <a:extLst>
+              <a:ext uri="{28A0092B-C50C-407E-A947-70E740481C1C}">
+                <a14:useLocalDpi xmlns:a14="http://schemas.microsoft.com/office/drawing/2010/main" val="0"/>
+              </a:ext>
+            </a:extLst>
+          </a:blip>
+          <a:stretch>
+            <a:fillRect/>
+          </a:stretch>
+        </p:blipFill>
+        <p:spPr>
+          <a:xfrm>
+            <a:off x="33079386" y="12620500"/>
+            <a:ext cx="2974944" cy="5748577"/>
+          </a:xfrm>
+          <a:prstGeom prst="rect">
+            <a:avLst/>
+          </a:prstGeom>
+        </p:spPr>
+      </p:pic>
       <p:sp>
         <p:nvSpPr>
           <p:cNvPr id="39" name="标题 1"/>
@@ -4262,7 +4463,7 @@
         </p:nvSpPr>
         <p:spPr>
           <a:xfrm>
-            <a:off x="35678478" y="26462973"/>
+            <a:off x="36128415" y="12368178"/>
             <a:ext cx="8669921" cy="1324596"/>
           </a:xfrm>
           <a:prstGeom prst="rect">
@@ -4302,7 +4503,7 @@
               <a:t>Match</a:t>
             </a:r>
             <a:r>
-              <a:rPr kumimoji="1" lang="zh-CN" altLang="en-US" sz="8000" b="1" dirty="0" smtClean="0">
+              <a:rPr kumimoji="1" lang="zh-CN" altLang="en-US" sz="8000" b="1" dirty="0">
                 <a:solidFill>
                   <a:srgbClr val="FF0000"/>
                 </a:solidFill>
@@ -4315,7 +4516,15 @@
                   <a:srgbClr val="FF0000"/>
                 </a:solidFill>
               </a:rPr>
-              <a:t>with</a:t>
+              <a:t>Y</a:t>
+            </a:r>
+            <a:r>
+              <a:rPr kumimoji="1" lang="en-US" altLang="zh-CN" sz="8000" b="1" dirty="0" smtClean="0">
+                <a:solidFill>
+                  <a:srgbClr val="FF0000"/>
+                </a:solidFill>
+              </a:rPr>
+              <a:t>our</a:t>
             </a:r>
             <a:r>
               <a:rPr kumimoji="1" lang="zh-CN" altLang="en-US" sz="8000" b="1" dirty="0" smtClean="0">
@@ -4331,23 +4540,15 @@
                   <a:srgbClr val="FF0000"/>
                 </a:solidFill>
               </a:rPr>
-              <a:t>your</a:t>
-            </a:r>
-            <a:r>
-              <a:rPr kumimoji="1" lang="zh-CN" altLang="en-US" sz="8000" b="1" dirty="0" smtClean="0">
+              <a:t>F</a:t>
+            </a:r>
+            <a:r>
+              <a:rPr kumimoji="1" lang="en-US" altLang="zh-CN" sz="8000" b="1" dirty="0" smtClean="0">
                 <a:solidFill>
                   <a:srgbClr val="FF0000"/>
                 </a:solidFill>
               </a:rPr>
-              <a:t> </a:t>
-            </a:r>
-            <a:r>
-              <a:rPr kumimoji="1" lang="en-US" altLang="zh-CN" sz="8000" b="1" dirty="0" smtClean="0">
-                <a:solidFill>
-                  <a:srgbClr val="FF0000"/>
-                </a:solidFill>
-              </a:rPr>
-              <a:t>face</a:t>
+              <a:t>ace</a:t>
             </a:r>
             <a:endParaRPr kumimoji="1" lang="zh-CN" altLang="en-US" sz="8000" b="1" dirty="0">
               <a:solidFill>
@@ -4365,8 +4566,8 @@
         </p:nvSpPr>
         <p:spPr>
           <a:xfrm>
-            <a:off x="35263645" y="28158773"/>
-            <a:ext cx="8040914" cy="975011"/>
+            <a:off x="36029195" y="13817885"/>
+            <a:ext cx="8040914" cy="2740366"/>
           </a:xfrm>
           <a:prstGeom prst="rect">
             <a:avLst/>
@@ -4396,53 +4597,66 @@
               <a:t>matching</a:t>
             </a:r>
           </a:p>
-        </p:txBody>
-      </p:sp>
-      <p:sp>
-        <p:nvSpPr>
-          <p:cNvPr id="42" name="下箭头 41"/>
-          <p:cNvSpPr/>
-          <p:nvPr/>
-        </p:nvSpPr>
-        <p:spPr>
-          <a:xfrm rot="10800000">
-            <a:off x="33426399" y="25387698"/>
-            <a:ext cx="234647" cy="974617"/>
-          </a:xfrm>
-          <a:prstGeom prst="downArrow">
-            <a:avLst/>
-          </a:prstGeom>
-          <a:solidFill>
-            <a:srgbClr val="FF0000"/>
-          </a:solidFill>
-          <a:ln>
-            <a:solidFill>
-              <a:srgbClr val="FF0000"/>
-            </a:solidFill>
-          </a:ln>
-        </p:spPr>
-        <p:style>
-          <a:lnRef idx="2">
-            <a:schemeClr val="accent1">
-              <a:shade val="50000"/>
-            </a:schemeClr>
-          </a:lnRef>
-          <a:fillRef idx="1">
-            <a:schemeClr val="accent1"/>
-          </a:fillRef>
-          <a:effectRef idx="0">
-            <a:schemeClr val="accent1"/>
-          </a:effectRef>
-          <a:fontRef idx="minor">
-            <a:schemeClr val="lt1"/>
-          </a:fontRef>
-        </p:style>
-        <p:txBody>
-          <a:bodyPr rtlCol="0" anchor="ctr"/>
-          <a:lstStyle/>
-          <a:p>
-            <a:pPr algn="ctr"/>
-            <a:endParaRPr kumimoji="1" lang="zh-CN" altLang="en-US"/>
+          <a:p>
+            <a:pPr marL="857250" indent="-857250">
+              <a:buFont typeface="Arial" charset="0"/>
+              <a:buChar char="•"/>
+            </a:pPr>
+            <a:r>
+              <a:rPr lang="en-US" altLang="zh-CN" dirty="0" smtClean="0"/>
+              <a:t>Move</a:t>
+            </a:r>
+            <a:r>
+              <a:rPr lang="zh-CN" altLang="en-US" dirty="0" smtClean="0"/>
+              <a:t> </a:t>
+            </a:r>
+            <a:r>
+              <a:rPr lang="en-US" altLang="zh-CN" dirty="0" smtClean="0"/>
+              <a:t>manually</a:t>
+            </a:r>
+          </a:p>
+          <a:p>
+            <a:pPr marL="857250" indent="-857250">
+              <a:buFont typeface="Arial" charset="0"/>
+              <a:buChar char="•"/>
+            </a:pPr>
+            <a:r>
+              <a:rPr lang="en-US" altLang="zh-CN" dirty="0" smtClean="0"/>
+              <a:t>Zoom</a:t>
+            </a:r>
+            <a:r>
+              <a:rPr lang="zh-CN" altLang="en-US" dirty="0" smtClean="0"/>
+              <a:t> </a:t>
+            </a:r>
+            <a:r>
+              <a:rPr lang="en-US" altLang="zh-CN" dirty="0" smtClean="0"/>
+              <a:t>in</a:t>
+            </a:r>
+            <a:r>
+              <a:rPr lang="zh-CN" altLang="en-US" dirty="0" smtClean="0"/>
+              <a:t> </a:t>
+            </a:r>
+            <a:r>
+              <a:rPr lang="en-US" altLang="zh-CN" dirty="0" smtClean="0"/>
+              <a:t>and</a:t>
+            </a:r>
+            <a:r>
+              <a:rPr lang="zh-CN" altLang="en-US" dirty="0" smtClean="0"/>
+              <a:t> </a:t>
+            </a:r>
+            <a:r>
+              <a:rPr lang="en-US" altLang="zh-CN" dirty="0" smtClean="0"/>
+              <a:t>Zoom</a:t>
+            </a:r>
+            <a:r>
+              <a:rPr lang="zh-CN" altLang="en-US" dirty="0" smtClean="0"/>
+              <a:t> </a:t>
+            </a:r>
+            <a:r>
+              <a:rPr lang="en-US" altLang="zh-CN" dirty="0" smtClean="0"/>
+              <a:t>out</a:t>
+            </a:r>
+            <a:endParaRPr lang="en-US" altLang="zh-CN" dirty="0" smtClean="0"/>
           </a:p>
         </p:txBody>
       </p:sp>
@@ -4468,7 +4682,7 @@
         </p:blipFill>
         <p:spPr>
           <a:xfrm>
-            <a:off x="32146755" y="19428770"/>
+            <a:off x="33099832" y="5586297"/>
             <a:ext cx="3028583" cy="5852224"/>
           </a:xfrm>
           <a:prstGeom prst="rect">
@@ -4486,8 +4700,8 @@
         </p:nvSpPr>
         <p:spPr>
           <a:xfrm>
-            <a:off x="35391754" y="19476686"/>
-            <a:ext cx="7280245" cy="1324596"/>
+            <a:off x="36130795" y="5585495"/>
+            <a:ext cx="7912805" cy="1265807"/>
           </a:xfrm>
           <a:prstGeom prst="rect">
             <a:avLst/>
@@ -4523,23 +4737,15 @@
                   <a:srgbClr val="FF0000"/>
                 </a:solidFill>
               </a:rPr>
-              <a:t>Our</a:t>
-            </a:r>
-            <a:r>
-              <a:rPr kumimoji="1" lang="zh-CN" altLang="en-US" sz="8000" b="1" dirty="0" smtClean="0">
+              <a:t>R</a:t>
+            </a:r>
+            <a:r>
+              <a:rPr kumimoji="1" lang="en-US" altLang="zh-CN" sz="8000" b="1" dirty="0" smtClean="0">
                 <a:solidFill>
                   <a:srgbClr val="FF0000"/>
                 </a:solidFill>
               </a:rPr>
-              <a:t> </a:t>
-            </a:r>
-            <a:r>
-              <a:rPr kumimoji="1" lang="en-US" altLang="zh-CN" sz="8000" b="1" dirty="0" smtClean="0">
-                <a:solidFill>
-                  <a:srgbClr val="FF0000"/>
-                </a:solidFill>
-              </a:rPr>
-              <a:t>recommendation</a:t>
+              <a:t>ecommendation</a:t>
             </a:r>
             <a:endParaRPr kumimoji="1" lang="zh-CN" altLang="en-US" sz="8000" b="1" dirty="0">
               <a:solidFill>
@@ -4557,7 +4763,7 @@
         </p:nvSpPr>
         <p:spPr>
           <a:xfrm>
-            <a:off x="35416045" y="21351573"/>
+            <a:off x="36002686" y="7401594"/>
             <a:ext cx="8040914" cy="3623043"/>
           </a:xfrm>
           <a:prstGeom prst="rect">
@@ -4674,171 +4880,606 @@
       </p:sp>
       <p:sp>
         <p:nvSpPr>
-          <p:cNvPr id="46" name="文本框 45"/>
-          <p:cNvSpPr txBox="1"/>
+          <p:cNvPr id="41" name="下箭头 40"/>
+          <p:cNvSpPr/>
           <p:nvPr/>
         </p:nvSpPr>
         <p:spPr>
           <a:xfrm>
-            <a:off x="15443200" y="6531428"/>
-            <a:ext cx="15335523" cy="23924626"/>
+            <a:off x="34375648" y="18530501"/>
+            <a:ext cx="304468" cy="822217"/>
+          </a:xfrm>
+          <a:prstGeom prst="downArrow">
+            <a:avLst/>
+          </a:prstGeom>
+          <a:solidFill>
+            <a:srgbClr val="FF0000"/>
+          </a:solidFill>
+          <a:ln>
+            <a:solidFill>
+              <a:srgbClr val="FF0000"/>
+            </a:solidFill>
+          </a:ln>
+          <a:scene3d>
+            <a:camera prst="orthographicFront">
+              <a:rot lat="0" lon="0" rev="10800000"/>
+            </a:camera>
+            <a:lightRig rig="threePt" dir="t"/>
+          </a:scene3d>
+        </p:spPr>
+        <p:style>
+          <a:lnRef idx="2">
+            <a:schemeClr val="accent1">
+              <a:shade val="50000"/>
+            </a:schemeClr>
+          </a:lnRef>
+          <a:fillRef idx="1">
+            <a:schemeClr val="accent1"/>
+          </a:fillRef>
+          <a:effectRef idx="0">
+            <a:schemeClr val="accent1"/>
+          </a:effectRef>
+          <a:fontRef idx="minor">
+            <a:schemeClr val="lt1"/>
+          </a:fontRef>
+        </p:style>
+        <p:txBody>
+          <a:bodyPr rtlCol="0" anchor="ctr"/>
+          <a:lstStyle/>
+          <a:p>
+            <a:pPr algn="ctr"/>
+            <a:endParaRPr kumimoji="1" lang="zh-CN" altLang="en-US"/>
+          </a:p>
+        </p:txBody>
+      </p:sp>
+      <p:sp>
+        <p:nvSpPr>
+          <p:cNvPr id="49" name="下箭头 48"/>
+          <p:cNvSpPr/>
+          <p:nvPr/>
+        </p:nvSpPr>
+        <p:spPr>
+          <a:xfrm>
+            <a:off x="34414624" y="11625381"/>
+            <a:ext cx="304468" cy="822217"/>
+          </a:xfrm>
+          <a:prstGeom prst="downArrow">
+            <a:avLst/>
+          </a:prstGeom>
+          <a:solidFill>
+            <a:srgbClr val="FF0000"/>
+          </a:solidFill>
+          <a:ln>
+            <a:solidFill>
+              <a:srgbClr val="FF0000"/>
+            </a:solidFill>
+          </a:ln>
+          <a:scene3d>
+            <a:camera prst="orthographicFront">
+              <a:rot lat="0" lon="0" rev="10800000"/>
+            </a:camera>
+            <a:lightRig rig="threePt" dir="t"/>
+          </a:scene3d>
+        </p:spPr>
+        <p:style>
+          <a:lnRef idx="2">
+            <a:schemeClr val="accent1">
+              <a:shade val="50000"/>
+            </a:schemeClr>
+          </a:lnRef>
+          <a:fillRef idx="1">
+            <a:schemeClr val="accent1"/>
+          </a:fillRef>
+          <a:effectRef idx="0">
+            <a:schemeClr val="accent1"/>
+          </a:effectRef>
+          <a:fontRef idx="minor">
+            <a:schemeClr val="lt1"/>
+          </a:fontRef>
+        </p:style>
+        <p:txBody>
+          <a:bodyPr rtlCol="0" anchor="ctr"/>
+          <a:lstStyle/>
+          <a:p>
+            <a:pPr algn="ctr"/>
+            <a:endParaRPr kumimoji="1" lang="zh-CN" altLang="en-US"/>
+          </a:p>
+        </p:txBody>
+      </p:sp>
+      <p:grpSp>
+        <p:nvGrpSpPr>
+          <p:cNvPr id="15" name="组 14"/>
+          <p:cNvGrpSpPr/>
+          <p:nvPr/>
+        </p:nvGrpSpPr>
+        <p:grpSpPr>
+          <a:xfrm>
+            <a:off x="12752773" y="8732940"/>
+            <a:ext cx="18986923" cy="6820523"/>
+            <a:chOff x="12727561" y="8132206"/>
+            <a:chExt cx="18986923" cy="6820523"/>
+          </a:xfrm>
+        </p:grpSpPr>
+        <p:sp>
+          <p:nvSpPr>
+            <p:cNvPr id="5" name="文本框 4"/>
+            <p:cNvSpPr txBox="1"/>
+            <p:nvPr/>
+          </p:nvSpPr>
+          <p:spPr>
+            <a:xfrm>
+              <a:off x="12785187" y="9749427"/>
+              <a:ext cx="16251994" cy="5170646"/>
+            </a:xfrm>
+            <a:prstGeom prst="rect">
+              <a:avLst/>
+            </a:prstGeom>
+            <a:noFill/>
+          </p:spPr>
+          <p:txBody>
+            <a:bodyPr wrap="square" rtlCol="0">
+              <a:spAutoFit/>
+            </a:bodyPr>
+            <a:lstStyle/>
+            <a:p>
+              <a:r>
+                <a:rPr lang="en-US" altLang="zh-CN" sz="3300" b="1" dirty="0" err="1"/>
+                <a:t>GrabCut</a:t>
+              </a:r>
+              <a:r>
+                <a:rPr lang="en-US" altLang="zh-CN" sz="3300" dirty="0"/>
+                <a:t> is an </a:t>
+              </a:r>
+              <a:r>
+                <a:rPr lang="en-US" altLang="zh-CN" sz="3300" dirty="0"/>
+                <a:t>image segmentation method based on graph cuts.</a:t>
+              </a:r>
+            </a:p>
+            <a:p>
+              <a:r>
+                <a:rPr lang="en-US" altLang="zh-CN" sz="3300" dirty="0"/>
+                <a:t>Starting with a user-specified bounding box around the object to be segmented, </a:t>
+              </a:r>
+              <a:r>
+                <a:rPr lang="en-US" altLang="zh-CN" sz="3300" dirty="0" err="1" smtClean="0"/>
+                <a:t>GrabCut</a:t>
+              </a:r>
+              <a:r>
+                <a:rPr lang="zh-CN" altLang="en-US" sz="3300" dirty="0" smtClean="0"/>
+                <a:t> </a:t>
+              </a:r>
+              <a:r>
+                <a:rPr lang="en-US" altLang="zh-CN" sz="3300" dirty="0" smtClean="0"/>
+                <a:t>estimates </a:t>
+              </a:r>
+              <a:r>
+                <a:rPr lang="en-US" altLang="zh-CN" sz="3300" dirty="0"/>
+                <a:t>the color distribution of the target object and that of the background using a Gaussian mixture model. </a:t>
+              </a:r>
+              <a:r>
+                <a:rPr lang="en-US" altLang="zh-CN" sz="3300" dirty="0"/>
+                <a:t>This is used to construct a Markov random field over the pixel labels, with an energy function that prefers connected regions having the same label, and running a graph cut based optimization to infer their values. As this estimate is likely to be more accurate than the original, taken from the bounding box, this two-step procedure </a:t>
+              </a:r>
+              <a:r>
+                <a:rPr lang="en-US" altLang="zh-CN" sz="3300" dirty="0"/>
+                <a:t>is repeated until convergence.</a:t>
+              </a:r>
+            </a:p>
+            <a:p>
+              <a:r>
+                <a:rPr lang="en-US" altLang="zh-CN" sz="3300" dirty="0"/>
+                <a:t>Estimates can be further corrected by the user by pointing out misclassified regions and rerunning the optimization. The method </a:t>
+              </a:r>
+              <a:r>
+                <a:rPr lang="zh-CN" altLang="en-US" sz="3300" dirty="0" smtClean="0"/>
+                <a:t> </a:t>
+              </a:r>
+              <a:r>
+                <a:rPr lang="en-US" altLang="zh-CN" sz="3300" dirty="0" smtClean="0"/>
+                <a:t>preserve </a:t>
+              </a:r>
+              <a:r>
+                <a:rPr lang="en-US" altLang="zh-CN" sz="3300" dirty="0"/>
+                <a:t>edges</a:t>
+              </a:r>
+              <a:r>
+                <a:rPr lang="en-US" altLang="zh-CN" sz="3300" dirty="0" smtClean="0"/>
+                <a:t>.</a:t>
+              </a:r>
+              <a:endParaRPr lang="en-US" altLang="zh-CN" sz="3300" dirty="0"/>
+            </a:p>
+          </p:txBody>
+        </p:sp>
+        <p:sp>
+          <p:nvSpPr>
+            <p:cNvPr id="51" name="矩形 50"/>
+            <p:cNvSpPr/>
+            <p:nvPr/>
+          </p:nvSpPr>
+          <p:spPr>
+            <a:xfrm>
+              <a:off x="12727561" y="8132206"/>
+              <a:ext cx="6297227" cy="1026766"/>
+            </a:xfrm>
+            <a:prstGeom prst="rect">
+              <a:avLst/>
+            </a:prstGeom>
+            <a:solidFill>
+              <a:srgbClr val="FF0000">
+                <a:alpha val="80000"/>
+              </a:srgbClr>
+            </a:solidFill>
+            <a:ln>
+              <a:noFill/>
+            </a:ln>
+          </p:spPr>
+          <p:style>
+            <a:lnRef idx="2">
+              <a:schemeClr val="accent1">
+                <a:shade val="50000"/>
+              </a:schemeClr>
+            </a:lnRef>
+            <a:fillRef idx="1">
+              <a:schemeClr val="accent1"/>
+            </a:fillRef>
+            <a:effectRef idx="0">
+              <a:schemeClr val="accent1"/>
+            </a:effectRef>
+            <a:fontRef idx="minor">
+              <a:schemeClr val="lt1"/>
+            </a:fontRef>
+          </p:style>
+          <p:txBody>
+            <a:bodyPr rtlCol="0" anchor="ctr"/>
+            <a:lstStyle/>
+            <a:p>
+              <a:pPr algn="ctr"/>
+              <a:r>
+                <a:rPr kumimoji="1" lang="en-US" altLang="zh-CN" dirty="0" err="1" smtClean="0"/>
+                <a:t>GrabCut</a:t>
+              </a:r>
+              <a:endParaRPr kumimoji="1" lang="zh-CN" altLang="en-US" dirty="0"/>
+            </a:p>
+          </p:txBody>
+        </p:sp>
+        <p:pic>
+          <p:nvPicPr>
+            <p:cNvPr id="9" name="图片 8"/>
+            <p:cNvPicPr>
+              <a:picLocks noChangeAspect="1"/>
+            </p:cNvPicPr>
+            <p:nvPr/>
+          </p:nvPicPr>
+          <p:blipFill rotWithShape="1">
+            <a:blip r:embed="rId11">
+              <a:extLst>
+                <a:ext uri="{28A0092B-C50C-407E-A947-70E740481C1C}">
+                  <a14:useLocalDpi xmlns:a14="http://schemas.microsoft.com/office/drawing/2010/main" val="0"/>
+                </a:ext>
+              </a:extLst>
+            </a:blip>
+            <a:srcRect l="1468" t="4631" r="2128" b="3133"/>
+            <a:stretch/>
+          </p:blipFill>
+          <p:spPr>
+            <a:xfrm>
+              <a:off x="29235500" y="8936955"/>
+              <a:ext cx="2478984" cy="1840481"/>
+            </a:xfrm>
+            <a:prstGeom prst="rect">
+              <a:avLst/>
+            </a:prstGeom>
+          </p:spPr>
+        </p:pic>
+        <p:pic>
+          <p:nvPicPr>
+            <p:cNvPr id="10" name="图片 9"/>
+            <p:cNvPicPr>
+              <a:picLocks noChangeAspect="1"/>
+            </p:cNvPicPr>
+            <p:nvPr/>
+          </p:nvPicPr>
+          <p:blipFill rotWithShape="1">
+            <a:blip r:embed="rId12">
+              <a:extLst>
+                <a:ext uri="{28A0092B-C50C-407E-A947-70E740481C1C}">
+                  <a14:useLocalDpi xmlns:a14="http://schemas.microsoft.com/office/drawing/2010/main" val="0"/>
+                </a:ext>
+              </a:extLst>
+            </a:blip>
+            <a:srcRect l="1468" t="5773" r="2128" b="3245"/>
+            <a:stretch/>
+          </p:blipFill>
+          <p:spPr>
+            <a:xfrm>
+              <a:off x="29235190" y="11045610"/>
+              <a:ext cx="2478985" cy="1815463"/>
+            </a:xfrm>
+            <a:prstGeom prst="rect">
+              <a:avLst/>
+            </a:prstGeom>
+          </p:spPr>
+        </p:pic>
+        <p:pic>
+          <p:nvPicPr>
+            <p:cNvPr id="12" name="图片 11"/>
+            <p:cNvPicPr>
+              <a:picLocks noChangeAspect="1"/>
+            </p:cNvPicPr>
+            <p:nvPr/>
+          </p:nvPicPr>
+          <p:blipFill rotWithShape="1">
+            <a:blip r:embed="rId13">
+              <a:extLst>
+                <a:ext uri="{28A0092B-C50C-407E-A947-70E740481C1C}">
+                  <a14:useLocalDpi xmlns:a14="http://schemas.microsoft.com/office/drawing/2010/main" val="0"/>
+                </a:ext>
+              </a:extLst>
+            </a:blip>
+            <a:srcRect l="1468" t="4032" r="2128" b="4583"/>
+            <a:stretch/>
+          </p:blipFill>
+          <p:spPr>
+            <a:xfrm>
+              <a:off x="29235499" y="13129248"/>
+              <a:ext cx="2478983" cy="1823481"/>
+            </a:xfrm>
+            <a:prstGeom prst="rect">
+              <a:avLst/>
+            </a:prstGeom>
+          </p:spPr>
+        </p:pic>
+      </p:grpSp>
+      <p:sp>
+        <p:nvSpPr>
+          <p:cNvPr id="56" name="矩形 55"/>
+          <p:cNvSpPr/>
+          <p:nvPr/>
+        </p:nvSpPr>
+        <p:spPr>
+          <a:xfrm>
+            <a:off x="-1" y="25987608"/>
+            <a:ext cx="43891200" cy="6979869"/>
           </a:xfrm>
           <a:prstGeom prst="rect">
             <a:avLst/>
           </a:prstGeom>
-          <a:noFill/>
+          <a:solidFill>
+            <a:schemeClr val="accent1">
+              <a:lumMod val="60000"/>
+              <a:lumOff val="40000"/>
+            </a:schemeClr>
+          </a:solidFill>
+          <a:ln>
+            <a:noFill/>
+          </a:ln>
         </p:spPr>
-        <p:txBody>
-          <a:bodyPr wrap="square" rtlCol="0">
-            <a:spAutoFit/>
-          </a:bodyPr>
-          <a:lstStyle/>
-          <a:p>
+        <p:style>
+          <a:lnRef idx="2">
+            <a:schemeClr val="accent1">
+              <a:shade val="50000"/>
+            </a:schemeClr>
+          </a:lnRef>
+          <a:fillRef idx="1">
+            <a:schemeClr val="accent1"/>
+          </a:fillRef>
+          <a:effectRef idx="0">
+            <a:schemeClr val="accent1"/>
+          </a:effectRef>
+          <a:fontRef idx="minor">
+            <a:schemeClr val="lt1"/>
+          </a:fontRef>
+        </p:style>
+        <p:txBody>
+          <a:bodyPr rtlCol="0" anchor="ctr"/>
+          <a:lstStyle/>
+          <a:p>
+            <a:pPr algn="ctr"/>
             <a:r>
               <a:rPr kumimoji="1" lang="zh-CN" altLang="en-US" dirty="0" smtClean="0"/>
-              <a:t>中间可以写</a:t>
+              <a:t>这个区域可以分成两半，分别写</a:t>
+            </a:r>
+            <a:r>
+              <a:rPr kumimoji="1" lang="en-US" altLang="zh-CN" dirty="0"/>
+              <a:t>User</a:t>
+            </a:r>
+            <a:r>
+              <a:rPr kumimoji="1" lang="zh-CN" altLang="en-US" dirty="0"/>
+              <a:t> </a:t>
+            </a:r>
+            <a:r>
+              <a:rPr kumimoji="1" lang="en-US" altLang="zh-CN" dirty="0"/>
+              <a:t>Story</a:t>
+            </a:r>
+            <a:r>
+              <a:rPr kumimoji="1" lang="zh-CN" altLang="en-US" dirty="0"/>
+              <a:t> 和 </a:t>
             </a:r>
             <a:r>
               <a:rPr kumimoji="1" lang="en-US" altLang="zh-CN" dirty="0" smtClean="0"/>
-              <a:t>techniques,</a:t>
+              <a:t>Accomplishment</a:t>
             </a:r>
             <a:r>
               <a:rPr kumimoji="1" lang="zh-CN" altLang="en-US" dirty="0" smtClean="0"/>
-              <a:t> </a:t>
-            </a:r>
-            <a:r>
-              <a:rPr kumimoji="1" lang="en-US" altLang="zh-CN" dirty="0" smtClean="0"/>
-              <a:t>accomplishments,</a:t>
-            </a:r>
-            <a:r>
-              <a:rPr kumimoji="1" lang="zh-CN" altLang="en-US" dirty="0" smtClean="0"/>
-              <a:t> 或者其他的</a:t>
-            </a:r>
-            <a:endParaRPr kumimoji="1" lang="en-US" altLang="zh-CN" dirty="0" smtClean="0"/>
-          </a:p>
-          <a:p>
-            <a:endParaRPr kumimoji="1" lang="en-US" altLang="zh-CN" dirty="0"/>
-          </a:p>
-          <a:p>
-            <a:endParaRPr kumimoji="1" lang="en-US" altLang="zh-CN" dirty="0" smtClean="0"/>
-          </a:p>
-          <a:p>
-            <a:endParaRPr kumimoji="1" lang="en-US" altLang="zh-CN" dirty="0"/>
-          </a:p>
-          <a:p>
-            <a:endParaRPr kumimoji="1" lang="en-US" altLang="zh-CN" dirty="0" smtClean="0"/>
-          </a:p>
-          <a:p>
-            <a:endParaRPr kumimoji="1" lang="en-US" altLang="zh-CN" dirty="0"/>
-          </a:p>
-          <a:p>
-            <a:endParaRPr kumimoji="1" lang="en-US" altLang="zh-CN" dirty="0" smtClean="0"/>
-          </a:p>
-          <a:p>
-            <a:endParaRPr kumimoji="1" lang="en-US" altLang="zh-CN" dirty="0"/>
-          </a:p>
-          <a:p>
-            <a:endParaRPr kumimoji="1" lang="en-US" altLang="zh-CN" dirty="0" smtClean="0"/>
-          </a:p>
-          <a:p>
-            <a:endParaRPr kumimoji="1" lang="en-US" altLang="zh-CN" dirty="0"/>
-          </a:p>
-          <a:p>
-            <a:endParaRPr kumimoji="1" lang="en-US" altLang="zh-CN" dirty="0" smtClean="0"/>
-          </a:p>
-          <a:p>
-            <a:endParaRPr kumimoji="1" lang="en-US" altLang="zh-CN" dirty="0"/>
-          </a:p>
-          <a:p>
-            <a:endParaRPr kumimoji="1" lang="en-US" altLang="zh-CN" dirty="0" smtClean="0"/>
-          </a:p>
-          <a:p>
-            <a:endParaRPr kumimoji="1" lang="en-US" altLang="zh-CN" dirty="0"/>
-          </a:p>
-          <a:p>
-            <a:endParaRPr kumimoji="1" lang="en-US" altLang="zh-CN" dirty="0" smtClean="0"/>
-          </a:p>
-          <a:p>
-            <a:endParaRPr kumimoji="1" lang="en-US" altLang="zh-CN" dirty="0"/>
-          </a:p>
-          <a:p>
-            <a:endParaRPr kumimoji="1" lang="en-US" altLang="zh-CN" dirty="0" smtClean="0"/>
-          </a:p>
-          <a:p>
-            <a:endParaRPr kumimoji="1" lang="en-US" altLang="zh-CN" dirty="0"/>
-          </a:p>
-          <a:p>
-            <a:endParaRPr kumimoji="1" lang="en-US" altLang="zh-CN" dirty="0" smtClean="0"/>
-          </a:p>
-          <a:p>
-            <a:endParaRPr kumimoji="1" lang="en-US" altLang="zh-CN" dirty="0"/>
-          </a:p>
-          <a:p>
-            <a:endParaRPr kumimoji="1" lang="en-US" altLang="zh-CN" dirty="0" smtClean="0"/>
-          </a:p>
-          <a:p>
-            <a:endParaRPr kumimoji="1" lang="en-US" altLang="zh-CN" dirty="0"/>
-          </a:p>
-          <a:p>
-            <a:endParaRPr kumimoji="1" lang="en-US" altLang="zh-CN" dirty="0" smtClean="0"/>
-          </a:p>
-          <a:p>
-            <a:endParaRPr kumimoji="1" lang="en-US" altLang="zh-CN" dirty="0"/>
-          </a:p>
-          <a:p>
-            <a:endParaRPr kumimoji="1" lang="en-US" altLang="zh-CN" dirty="0" smtClean="0"/>
-          </a:p>
-          <a:p>
+              <a:t>，反正整个海报看起来左右对称就行</a:t>
+            </a:r>
             <a:endParaRPr kumimoji="1" lang="zh-CN" altLang="en-US" dirty="0"/>
           </a:p>
         </p:txBody>
       </p:sp>
-      <p:sp>
-        <p:nvSpPr>
-          <p:cNvPr id="48" name="文本框 47"/>
-          <p:cNvSpPr txBox="1"/>
+      <p:grpSp>
+        <p:nvGrpSpPr>
+          <p:cNvPr id="14" name="组 13"/>
+          <p:cNvGrpSpPr/>
           <p:nvPr/>
-        </p:nvSpPr>
-        <p:spPr>
+        </p:nvGrpSpPr>
+        <p:grpSpPr>
           <a:xfrm>
-            <a:off x="32146755" y="7264400"/>
-            <a:ext cx="9849632" cy="1857688"/>
+            <a:off x="12785187" y="16993236"/>
+            <a:ext cx="19062515" cy="6277534"/>
+            <a:chOff x="12747715" y="14466810"/>
+            <a:chExt cx="19062515" cy="6277534"/>
           </a:xfrm>
-          <a:prstGeom prst="rect">
-            <a:avLst/>
-          </a:prstGeom>
-          <a:noFill/>
-        </p:spPr>
-        <p:txBody>
-          <a:bodyPr wrap="square" rtlCol="0">
-            <a:spAutoFit/>
-          </a:bodyPr>
-          <a:lstStyle/>
-          <a:p>
-            <a:r>
-              <a:rPr kumimoji="1" lang="zh-CN" altLang="en-US" dirty="0" smtClean="0"/>
-              <a:t>这里可以写个</a:t>
-            </a:r>
-            <a:r>
-              <a:rPr kumimoji="1" lang="en-US" altLang="zh-CN" dirty="0" smtClean="0"/>
-              <a:t>save</a:t>
-            </a:r>
-            <a:r>
-              <a:rPr kumimoji="1" lang="zh-CN" altLang="en-US" dirty="0" smtClean="0"/>
-              <a:t> </a:t>
-            </a:r>
-            <a:r>
-              <a:rPr kumimoji="1" lang="en-US" altLang="zh-CN" dirty="0" smtClean="0"/>
-              <a:t>share</a:t>
-            </a:r>
-            <a:r>
-              <a:rPr kumimoji="1" lang="zh-CN" altLang="en-US" dirty="0" smtClean="0"/>
-              <a:t> 等等 我还没想好</a:t>
-            </a:r>
-            <a:endParaRPr kumimoji="1" lang="zh-CN" altLang="en-US" dirty="0"/>
-          </a:p>
-        </p:txBody>
-      </p:sp>
+        </p:grpSpPr>
+        <p:sp>
+          <p:nvSpPr>
+            <p:cNvPr id="52" name="矩形 51"/>
+            <p:cNvSpPr/>
+            <p:nvPr/>
+          </p:nvSpPr>
+          <p:spPr>
+            <a:xfrm>
+              <a:off x="12775067" y="14466810"/>
+              <a:ext cx="6297227" cy="1026766"/>
+            </a:xfrm>
+            <a:prstGeom prst="rect">
+              <a:avLst/>
+            </a:prstGeom>
+            <a:solidFill>
+              <a:srgbClr val="FF0000">
+                <a:alpha val="80000"/>
+              </a:srgbClr>
+            </a:solidFill>
+            <a:ln>
+              <a:noFill/>
+            </a:ln>
+          </p:spPr>
+          <p:style>
+            <a:lnRef idx="2">
+              <a:schemeClr val="accent1">
+                <a:shade val="50000"/>
+              </a:schemeClr>
+            </a:lnRef>
+            <a:fillRef idx="1">
+              <a:schemeClr val="accent1"/>
+            </a:fillRef>
+            <a:effectRef idx="0">
+              <a:schemeClr val="accent1"/>
+            </a:effectRef>
+            <a:fontRef idx="minor">
+              <a:schemeClr val="lt1"/>
+            </a:fontRef>
+          </p:style>
+          <p:txBody>
+            <a:bodyPr rtlCol="0" anchor="ctr"/>
+            <a:lstStyle/>
+            <a:p>
+              <a:pPr algn="ctr"/>
+              <a:r>
+                <a:rPr kumimoji="1" lang="en-US" altLang="zh-CN" dirty="0" err="1" smtClean="0"/>
+                <a:t>CoreImage</a:t>
+              </a:r>
+              <a:endParaRPr kumimoji="1" lang="zh-CN" altLang="en-US" dirty="0"/>
+            </a:p>
+          </p:txBody>
+        </p:sp>
+        <p:sp>
+          <p:nvSpPr>
+            <p:cNvPr id="54" name="文本框 53"/>
+            <p:cNvSpPr txBox="1"/>
+            <p:nvPr/>
+          </p:nvSpPr>
+          <p:spPr>
+            <a:xfrm>
+              <a:off x="12747715" y="16081529"/>
+              <a:ext cx="16251994" cy="4662815"/>
+            </a:xfrm>
+            <a:prstGeom prst="rect">
+              <a:avLst/>
+            </a:prstGeom>
+            <a:noFill/>
+          </p:spPr>
+          <p:txBody>
+            <a:bodyPr wrap="square" rtlCol="0">
+              <a:spAutoFit/>
+            </a:bodyPr>
+            <a:lstStyle/>
+            <a:p>
+              <a:r>
+                <a:rPr lang="en-US" altLang="zh-CN" sz="3300" b="1" dirty="0" err="1" smtClean="0"/>
+                <a:t>CoreImage</a:t>
+              </a:r>
+              <a:r>
+                <a:rPr lang="en-US" altLang="zh-CN" sz="3300" dirty="0"/>
+                <a:t> </a:t>
+              </a:r>
+              <a:r>
+                <a:rPr lang="en-US" altLang="zh-CN" sz="3300" dirty="0" smtClean="0"/>
+                <a:t> </a:t>
+              </a:r>
+              <a:r>
+                <a:rPr lang="en-US" altLang="zh-CN" sz="3300" dirty="0"/>
+                <a:t>is an image processing and analysis technology that provides high-performance processing for still and video images. </a:t>
+              </a:r>
+              <a:r>
+                <a:rPr lang="en-US" altLang="zh-CN" sz="3300" dirty="0"/>
+                <a:t>Use the many built-in image filters to process images and build complex effects by chaining filters. </a:t>
+              </a:r>
+              <a:r>
+                <a:rPr lang="en-US" altLang="zh-CN" sz="3300" dirty="0"/>
+                <a:t>For details, see Core Image Filter Reference</a:t>
+              </a:r>
+              <a:r>
+                <a:rPr lang="en-US" altLang="zh-CN" sz="3300" dirty="0" smtClean="0"/>
+                <a:t>. Developer can </a:t>
+              </a:r>
+              <a:r>
+                <a:rPr lang="en-US" altLang="zh-CN" sz="3300" dirty="0"/>
+                <a:t>also create new effects with custom filters and image processors; see Core Image Programming Guide</a:t>
+              </a:r>
+              <a:r>
+                <a:rPr lang="en-US" altLang="zh-CN" sz="3300" dirty="0" smtClean="0"/>
+                <a:t>.</a:t>
+              </a:r>
+            </a:p>
+            <a:p>
+              <a:r>
+                <a:rPr lang="en-US" altLang="zh-CN" sz="3300" dirty="0" smtClean="0"/>
+                <a:t>In our Hair Style Simulation, we mainly use </a:t>
+              </a:r>
+              <a:r>
+                <a:rPr lang="en-US" altLang="zh-CN" sz="3300" dirty="0" err="1" smtClean="0"/>
+                <a:t>CoreImage</a:t>
+              </a:r>
+              <a:r>
+                <a:rPr lang="en-US" altLang="zh-CN" sz="3300" dirty="0" smtClean="0"/>
+                <a:t> to detect human’s face, and send more detail information, such as eyes’ position and mouth’s position on the picture, to the backend part of the app, to calculate the user’s head shape so that our app can give the user recommendations hairstyle according to his/her head shape.</a:t>
+              </a:r>
+              <a:endParaRPr lang="en-US" altLang="zh-CN" sz="3300" dirty="0"/>
+            </a:p>
+          </p:txBody>
+        </p:sp>
+        <p:pic>
+          <p:nvPicPr>
+            <p:cNvPr id="13" name="图片 12"/>
+            <p:cNvPicPr>
+              <a:picLocks noChangeAspect="1"/>
+            </p:cNvPicPr>
+            <p:nvPr/>
+          </p:nvPicPr>
+          <p:blipFill>
+            <a:blip r:embed="rId14">
+              <a:extLst>
+                <a:ext uri="{28A0092B-C50C-407E-A947-70E740481C1C}">
+                  <a14:useLocalDpi xmlns:a14="http://schemas.microsoft.com/office/drawing/2010/main" val="0"/>
+                </a:ext>
+              </a:extLst>
+            </a:blip>
+            <a:stretch>
+              <a:fillRect/>
+            </a:stretch>
+          </p:blipFill>
+          <p:spPr>
+            <a:xfrm>
+              <a:off x="29331247" y="16208364"/>
+              <a:ext cx="2478983" cy="3889642"/>
+            </a:xfrm>
+            <a:prstGeom prst="rect">
+              <a:avLst/>
+            </a:prstGeom>
+          </p:spPr>
+        </p:pic>
+      </p:grpSp>
     </p:spTree>
     <p:extLst>
       <p:ext uri="{BB962C8B-B14F-4D97-AF65-F5344CB8AC3E}">

</xml_diff>

<commit_message>
Add user stories and accomplishments
</commit_message>
<xml_diff>
--- a/Hair Style Simulation Poster.pptx
+++ b/Hair Style Simulation Poster.pptx
@@ -243,7 +243,7 @@
           <a:p>
             <a:fld id="{BD54EFF9-6C1E-954C-A5FC-53A61CB8AA2F}" type="datetimeFigureOut">
               <a:rPr kumimoji="1" lang="zh-CN" altLang="en-US" smtClean="0"/>
-              <a:t>2017/12/10</a:t>
+              <a:t>2017/12/11</a:t>
             </a:fld>
             <a:endParaRPr kumimoji="1" lang="zh-CN" altLang="en-US"/>
           </a:p>
@@ -408,7 +408,7 @@
           <a:p>
             <a:fld id="{BD54EFF9-6C1E-954C-A5FC-53A61CB8AA2F}" type="datetimeFigureOut">
               <a:rPr kumimoji="1" lang="zh-CN" altLang="en-US" smtClean="0"/>
-              <a:t>2017/12/10</a:t>
+              <a:t>2017/12/11</a:t>
             </a:fld>
             <a:endParaRPr kumimoji="1" lang="zh-CN" altLang="en-US"/>
           </a:p>
@@ -583,7 +583,7 @@
           <a:p>
             <a:fld id="{BD54EFF9-6C1E-954C-A5FC-53A61CB8AA2F}" type="datetimeFigureOut">
               <a:rPr kumimoji="1" lang="zh-CN" altLang="en-US" smtClean="0"/>
-              <a:t>2017/12/10</a:t>
+              <a:t>2017/12/11</a:t>
             </a:fld>
             <a:endParaRPr kumimoji="1" lang="zh-CN" altLang="en-US"/>
           </a:p>
@@ -748,7 +748,7 @@
           <a:p>
             <a:fld id="{BD54EFF9-6C1E-954C-A5FC-53A61CB8AA2F}" type="datetimeFigureOut">
               <a:rPr kumimoji="1" lang="zh-CN" altLang="en-US" smtClean="0"/>
-              <a:t>2017/12/10</a:t>
+              <a:t>2017/12/11</a:t>
             </a:fld>
             <a:endParaRPr kumimoji="1" lang="zh-CN" altLang="en-US"/>
           </a:p>
@@ -987,7 +987,7 @@
           <a:p>
             <a:fld id="{BD54EFF9-6C1E-954C-A5FC-53A61CB8AA2F}" type="datetimeFigureOut">
               <a:rPr kumimoji="1" lang="zh-CN" altLang="en-US" smtClean="0"/>
-              <a:t>2017/12/10</a:t>
+              <a:t>2017/12/11</a:t>
             </a:fld>
             <a:endParaRPr kumimoji="1" lang="zh-CN" altLang="en-US"/>
           </a:p>
@@ -1214,7 +1214,7 @@
           <a:p>
             <a:fld id="{BD54EFF9-6C1E-954C-A5FC-53A61CB8AA2F}" type="datetimeFigureOut">
               <a:rPr kumimoji="1" lang="zh-CN" altLang="en-US" smtClean="0"/>
-              <a:t>2017/12/10</a:t>
+              <a:t>2017/12/11</a:t>
             </a:fld>
             <a:endParaRPr kumimoji="1" lang="zh-CN" altLang="en-US"/>
           </a:p>
@@ -1576,7 +1576,7 @@
           <a:p>
             <a:fld id="{BD54EFF9-6C1E-954C-A5FC-53A61CB8AA2F}" type="datetimeFigureOut">
               <a:rPr kumimoji="1" lang="zh-CN" altLang="en-US" smtClean="0"/>
-              <a:t>2017/12/10</a:t>
+              <a:t>2017/12/11</a:t>
             </a:fld>
             <a:endParaRPr kumimoji="1" lang="zh-CN" altLang="en-US"/>
           </a:p>
@@ -1689,7 +1689,7 @@
           <a:p>
             <a:fld id="{BD54EFF9-6C1E-954C-A5FC-53A61CB8AA2F}" type="datetimeFigureOut">
               <a:rPr kumimoji="1" lang="zh-CN" altLang="en-US" smtClean="0"/>
-              <a:t>2017/12/10</a:t>
+              <a:t>2017/12/11</a:t>
             </a:fld>
             <a:endParaRPr kumimoji="1" lang="zh-CN" altLang="en-US"/>
           </a:p>
@@ -1779,7 +1779,7 @@
           <a:p>
             <a:fld id="{BD54EFF9-6C1E-954C-A5FC-53A61CB8AA2F}" type="datetimeFigureOut">
               <a:rPr kumimoji="1" lang="zh-CN" altLang="en-US" smtClean="0"/>
-              <a:t>2017/12/10</a:t>
+              <a:t>2017/12/11</a:t>
             </a:fld>
             <a:endParaRPr kumimoji="1" lang="zh-CN" altLang="en-US"/>
           </a:p>
@@ -2051,7 +2051,7 @@
           <a:p>
             <a:fld id="{BD54EFF9-6C1E-954C-A5FC-53A61CB8AA2F}" type="datetimeFigureOut">
               <a:rPr kumimoji="1" lang="zh-CN" altLang="en-US" smtClean="0"/>
-              <a:t>2017/12/10</a:t>
+              <a:t>2017/12/11</a:t>
             </a:fld>
             <a:endParaRPr kumimoji="1" lang="zh-CN" altLang="en-US"/>
           </a:p>
@@ -2303,7 +2303,7 @@
           <a:p>
             <a:fld id="{BD54EFF9-6C1E-954C-A5FC-53A61CB8AA2F}" type="datetimeFigureOut">
               <a:rPr kumimoji="1" lang="zh-CN" altLang="en-US" smtClean="0"/>
-              <a:t>2017/12/10</a:t>
+              <a:t>2017/12/11</a:t>
             </a:fld>
             <a:endParaRPr kumimoji="1" lang="zh-CN" altLang="en-US"/>
           </a:p>
@@ -2511,7 +2511,7 @@
           <a:p>
             <a:fld id="{BD54EFF9-6C1E-954C-A5FC-53A61CB8AA2F}" type="datetimeFigureOut">
               <a:rPr kumimoji="1" lang="zh-CN" altLang="en-US" smtClean="0"/>
-              <a:t>2017/12/10</a:t>
+              <a:t>2017/12/11</a:t>
             </a:fld>
             <a:endParaRPr kumimoji="1" lang="zh-CN" altLang="en-US"/>
           </a:p>
@@ -2918,79 +2918,6 @@
       </p:grpSpPr>
       <p:sp>
         <p:nvSpPr>
-          <p:cNvPr id="53" name="矩形 52"/>
-          <p:cNvSpPr/>
-          <p:nvPr/>
-        </p:nvSpPr>
-        <p:spPr>
-          <a:xfrm>
-            <a:off x="-13769" y="25886387"/>
-            <a:ext cx="43891200" cy="6979229"/>
-          </a:xfrm>
-          <a:prstGeom prst="rect">
-            <a:avLst/>
-          </a:prstGeom>
-          <a:solidFill>
-            <a:schemeClr val="accent1">
-              <a:lumMod val="50000"/>
-            </a:schemeClr>
-          </a:solidFill>
-        </p:spPr>
-        <p:style>
-          <a:lnRef idx="2">
-            <a:schemeClr val="accent1">
-              <a:shade val="50000"/>
-            </a:schemeClr>
-          </a:lnRef>
-          <a:fillRef idx="1">
-            <a:schemeClr val="accent1"/>
-          </a:fillRef>
-          <a:effectRef idx="0">
-            <a:schemeClr val="accent1"/>
-          </a:effectRef>
-          <a:fontRef idx="minor">
-            <a:schemeClr val="lt1"/>
-          </a:fontRef>
-        </p:style>
-        <p:txBody>
-          <a:bodyPr rtlCol="0" anchor="ctr"/>
-          <a:lstStyle/>
-          <a:p>
-            <a:pPr algn="ctr"/>
-            <a:r>
-              <a:rPr kumimoji="1" lang="zh-CN" altLang="en-US" dirty="0" smtClean="0"/>
-              <a:t>这里交给你们了！！！！！ 可写</a:t>
-            </a:r>
-            <a:r>
-              <a:rPr kumimoji="1" lang="en-US" altLang="zh-CN" dirty="0" smtClean="0"/>
-              <a:t>user</a:t>
-            </a:r>
-            <a:r>
-              <a:rPr kumimoji="1" lang="zh-CN" altLang="en-US" dirty="0" smtClean="0"/>
-              <a:t> </a:t>
-            </a:r>
-            <a:r>
-              <a:rPr kumimoji="1" lang="en-US" altLang="zh-CN" dirty="0" smtClean="0"/>
-              <a:t>story</a:t>
-            </a:r>
-            <a:r>
-              <a:rPr kumimoji="1" lang="zh-CN" altLang="en-US" dirty="0" smtClean="0"/>
-              <a:t>和</a:t>
-            </a:r>
-            <a:r>
-              <a:rPr kumimoji="1" lang="en-US" altLang="zh-CN" dirty="0" smtClean="0"/>
-              <a:t>accomplishment</a:t>
-            </a:r>
-            <a:r>
-              <a:rPr kumimoji="1" lang="zh-CN" altLang="en-US" dirty="0" smtClean="0"/>
-              <a:t> </a:t>
-            </a:r>
-            <a:endParaRPr kumimoji="1" lang="zh-CN" altLang="en-US" dirty="0"/>
-          </a:p>
-        </p:txBody>
-      </p:sp>
-      <p:sp>
-        <p:nvSpPr>
           <p:cNvPr id="7" name="矩形 6"/>
           <p:cNvSpPr/>
           <p:nvPr/>
@@ -3055,7 +2982,7 @@
         </p:nvSpPr>
         <p:spPr>
           <a:xfrm>
-            <a:off x="0" y="21206"/>
+            <a:off x="29341" y="51175"/>
             <a:ext cx="43891200" cy="5029200"/>
           </a:xfrm>
           <a:prstGeom prst="rect">
@@ -3313,15 +3240,7 @@
                   <a:schemeClr val="bg1"/>
                 </a:solidFill>
               </a:rPr>
-              <a:t> </a:t>
-            </a:r>
-            <a:r>
-              <a:rPr kumimoji="1" lang="zh-CN" altLang="en-US" sz="2800" dirty="0" smtClean="0">
-                <a:solidFill>
-                  <a:schemeClr val="bg1"/>
-                </a:solidFill>
-              </a:rPr>
-              <a:t> </a:t>
+              <a:t>  </a:t>
             </a:r>
             <a:r>
               <a:rPr kumimoji="1" lang="en-US" altLang="zh-CN" sz="2800" dirty="0" smtClean="0">
@@ -3403,6 +3322,52 @@
                 <a:schemeClr val="bg1"/>
               </a:solidFill>
             </a:endParaRPr>
+          </a:p>
+        </p:txBody>
+      </p:sp>
+      <p:sp>
+        <p:nvSpPr>
+          <p:cNvPr id="23" name="矩形 22"/>
+          <p:cNvSpPr/>
+          <p:nvPr/>
+        </p:nvSpPr>
+        <p:spPr>
+          <a:xfrm>
+            <a:off x="35366674" y="1097384"/>
+            <a:ext cx="5578126" cy="2594083"/>
+          </a:xfrm>
+          <a:prstGeom prst="rect">
+            <a:avLst/>
+          </a:prstGeom>
+          <a:solidFill>
+            <a:schemeClr val="bg1"/>
+          </a:solidFill>
+          <a:ln>
+            <a:noFill/>
+          </a:ln>
+        </p:spPr>
+        <p:style>
+          <a:lnRef idx="2">
+            <a:schemeClr val="accent1">
+              <a:shade val="50000"/>
+            </a:schemeClr>
+          </a:lnRef>
+          <a:fillRef idx="1">
+            <a:schemeClr val="accent1"/>
+          </a:fillRef>
+          <a:effectRef idx="0">
+            <a:schemeClr val="accent1"/>
+          </a:effectRef>
+          <a:fontRef idx="minor">
+            <a:schemeClr val="lt1"/>
+          </a:fontRef>
+        </p:style>
+        <p:txBody>
+          <a:bodyPr rtlCol="0" anchor="ctr"/>
+          <a:lstStyle/>
+          <a:p>
+            <a:pPr algn="ctr"/>
+            <a:endParaRPr kumimoji="1" lang="zh-CN" altLang="en-US"/>
           </a:p>
         </p:txBody>
       </p:sp>
@@ -3523,18 +3488,64 @@
           </a:prstGeom>
         </p:spPr>
       </p:pic>
+      <p:sp>
+        <p:nvSpPr>
+          <p:cNvPr id="42" name="矩形 41"/>
+          <p:cNvSpPr/>
+          <p:nvPr/>
+        </p:nvSpPr>
+        <p:spPr>
+          <a:xfrm>
+            <a:off x="35488737" y="1241638"/>
+            <a:ext cx="5334000" cy="2361864"/>
+          </a:xfrm>
+          <a:prstGeom prst="rect">
+            <a:avLst/>
+          </a:prstGeom>
+          <a:solidFill>
+            <a:srgbClr val="CD0000"/>
+          </a:solidFill>
+          <a:ln>
+            <a:noFill/>
+          </a:ln>
+        </p:spPr>
+        <p:style>
+          <a:lnRef idx="2">
+            <a:schemeClr val="accent1">
+              <a:shade val="50000"/>
+            </a:schemeClr>
+          </a:lnRef>
+          <a:fillRef idx="1">
+            <a:schemeClr val="accent1"/>
+          </a:fillRef>
+          <a:effectRef idx="0">
+            <a:schemeClr val="accent1"/>
+          </a:effectRef>
+          <a:fontRef idx="minor">
+            <a:schemeClr val="lt1"/>
+          </a:fontRef>
+        </p:style>
+        <p:txBody>
+          <a:bodyPr rtlCol="0" anchor="ctr"/>
+          <a:lstStyle/>
+          <a:p>
+            <a:pPr algn="ctr"/>
+            <a:endParaRPr kumimoji="1" lang="zh-CN" altLang="en-US"/>
+          </a:p>
+        </p:txBody>
+      </p:sp>
       <p:grpSp>
         <p:nvGrpSpPr>
-          <p:cNvPr id="27" name="组 26"/>
+          <p:cNvPr id="36" name="组 35"/>
           <p:cNvGrpSpPr/>
           <p:nvPr/>
         </p:nvGrpSpPr>
         <p:grpSpPr>
           <a:xfrm>
-            <a:off x="616461" y="29761333"/>
-            <a:ext cx="2492332" cy="2315689"/>
-            <a:chOff x="102807" y="30646910"/>
-            <a:chExt cx="2412808" cy="2508228"/>
+            <a:off x="35922215" y="1359502"/>
+            <a:ext cx="2492332" cy="2442338"/>
+            <a:chOff x="728537" y="29761333"/>
+            <a:chExt cx="2492332" cy="2442338"/>
           </a:xfrm>
         </p:grpSpPr>
         <p:pic>
@@ -3559,8 +3570,8 @@
           </p:blipFill>
           <p:spPr>
             <a:xfrm>
-              <a:off x="347680" y="30646910"/>
-              <a:ext cx="1564640" cy="1564640"/>
+              <a:off x="955242" y="29761333"/>
+              <a:ext cx="1584000" cy="1584000"/>
             </a:xfrm>
             <a:prstGeom prst="rect">
               <a:avLst/>
@@ -3575,8 +3586,8 @@
           </p:nvSpPr>
           <p:spPr>
             <a:xfrm>
-              <a:off x="102807" y="32099059"/>
-              <a:ext cx="2412808" cy="1056079"/>
+              <a:off x="728537" y="31228660"/>
+              <a:ext cx="2492332" cy="975011"/>
             </a:xfrm>
             <a:prstGeom prst="rect">
               <a:avLst/>
@@ -3614,10 +3625,10 @@
         </p:nvGrpSpPr>
         <p:grpSpPr>
           <a:xfrm>
-            <a:off x="41468499" y="29969390"/>
-            <a:ext cx="1908531" cy="2464220"/>
-            <a:chOff x="41710820" y="30646910"/>
-            <a:chExt cx="1908531" cy="2464220"/>
+            <a:off x="38401146" y="1370435"/>
+            <a:ext cx="1908531" cy="2431404"/>
+            <a:chOff x="41788692" y="30646910"/>
+            <a:chExt cx="1908531" cy="2431404"/>
           </a:xfrm>
         </p:grpSpPr>
         <p:pic>
@@ -3658,7 +3669,7 @@
           </p:nvSpPr>
           <p:spPr>
             <a:xfrm>
-              <a:off x="41710820" y="32136119"/>
+              <a:off x="41788692" y="32103303"/>
               <a:ext cx="1908531" cy="975011"/>
             </a:xfrm>
             <a:prstGeom prst="rect">
@@ -4803,7 +4814,6 @@
               <a:rPr lang="en-US" altLang="zh-CN" dirty="0" smtClean="0"/>
               <a:t>recommendation</a:t>
             </a:r>
-            <a:endParaRPr lang="en-US" altLang="zh-CN" dirty="0" smtClean="0"/>
           </a:p>
         </p:txBody>
       </p:sp>
@@ -5018,11 +5028,7 @@
               </a:r>
               <a:r>
                 <a:rPr lang="en-US" altLang="zh-CN" sz="3300" dirty="0" smtClean="0"/>
-                <a:t>, e</a:t>
-              </a:r>
-              <a:r>
-                <a:rPr lang="en-US" altLang="zh-CN" sz="3300" dirty="0" smtClean="0"/>
-                <a:t>stimates </a:t>
+                <a:t>, estimates </a:t>
               </a:r>
               <a:r>
                 <a:rPr lang="en-US" altLang="zh-CN" sz="3300" dirty="0"/>
@@ -5283,27 +5289,7 @@
               </a:pPr>
               <a:r>
                 <a:rPr lang="en-US" altLang="zh-CN" sz="3300" dirty="0" smtClean="0"/>
-                <a:t>In </a:t>
-              </a:r>
-              <a:r>
-                <a:rPr lang="en-US" altLang="zh-CN" sz="3300" dirty="0" smtClean="0"/>
-                <a:t>our </a:t>
-              </a:r>
-              <a:r>
-                <a:rPr lang="en-US" altLang="zh-CN" sz="3300" dirty="0" smtClean="0"/>
-                <a:t>app</a:t>
-              </a:r>
-              <a:r>
-                <a:rPr lang="en-US" altLang="zh-CN" sz="3300" dirty="0" smtClean="0"/>
-                <a:t>, </a:t>
-              </a:r>
-              <a:r>
-                <a:rPr lang="en-US" altLang="zh-CN" sz="3300" dirty="0" smtClean="0"/>
-                <a:t>we </a:t>
-              </a:r>
-              <a:r>
-                <a:rPr lang="en-US" altLang="zh-CN" sz="3300" dirty="0" smtClean="0"/>
-                <a:t>use Core</a:t>
+                <a:t>In our app, we use Core</a:t>
               </a:r>
               <a:r>
                 <a:rPr lang="zh-CN" altLang="en-US" sz="3300" dirty="0" smtClean="0"/>
@@ -5311,15 +5297,7 @@
               </a:r>
               <a:r>
                 <a:rPr lang="en-US" altLang="zh-CN" sz="3300" dirty="0" smtClean="0"/>
-                <a:t>Image </a:t>
-              </a:r>
-              <a:r>
-                <a:rPr lang="en-US" altLang="zh-CN" sz="3300" dirty="0" smtClean="0"/>
-                <a:t>to detect </a:t>
-              </a:r>
-              <a:r>
-                <a:rPr lang="en-US" altLang="zh-CN" sz="3300" dirty="0" smtClean="0"/>
-                <a:t>human face</a:t>
+                <a:t>Image to detect human face</a:t>
               </a:r>
               <a:r>
                 <a:rPr lang="zh-CN" altLang="en-US" sz="3300" dirty="0" smtClean="0"/>
@@ -5335,15 +5313,7 @@
               </a:r>
               <a:r>
                 <a:rPr lang="en-US" altLang="zh-CN" sz="3300" dirty="0" smtClean="0"/>
-                <a:t>detailed </a:t>
-              </a:r>
-              <a:r>
-                <a:rPr lang="en-US" altLang="zh-CN" sz="3300" dirty="0" smtClean="0"/>
-                <a:t>information, such as eyes’ position and mouth’s </a:t>
-              </a:r>
-              <a:r>
-                <a:rPr lang="en-US" altLang="zh-CN" sz="3300" dirty="0" smtClean="0"/>
-                <a:t>position,</a:t>
+                <a:t>detailed information, such as eyes’ position and mouth’s position,</a:t>
               </a:r>
             </a:p>
             <a:p>
@@ -5380,19 +5350,7 @@
               </a:r>
               <a:r>
                 <a:rPr lang="en-US" altLang="zh-CN" sz="3300" dirty="0" smtClean="0"/>
-                <a:t>sent</a:t>
-              </a:r>
-              <a:r>
-                <a:rPr lang="en-US" altLang="zh-CN" sz="3300" dirty="0" smtClean="0"/>
-                <a:t> </a:t>
-              </a:r>
-              <a:r>
-                <a:rPr lang="en-US" altLang="zh-CN" sz="3300" dirty="0" smtClean="0"/>
-                <a:t>to the </a:t>
-              </a:r>
-              <a:r>
-                <a:rPr lang="en-US" altLang="zh-CN" sz="3300" dirty="0" smtClean="0"/>
-                <a:t>backend</a:t>
+                <a:t>sent to the backend</a:t>
               </a:r>
               <a:r>
                 <a:rPr lang="zh-CN" altLang="en-US" sz="3300" dirty="0" smtClean="0"/>
@@ -5400,47 +5358,7 @@
               </a:r>
               <a:r>
                 <a:rPr lang="en-US" altLang="zh-CN" sz="3300" dirty="0" smtClean="0"/>
-                <a:t>of </a:t>
-              </a:r>
-              <a:r>
-                <a:rPr lang="en-US" altLang="zh-CN" sz="3300" dirty="0" smtClean="0"/>
-                <a:t>the app, </a:t>
-              </a:r>
-              <a:r>
-                <a:rPr lang="en-US" altLang="zh-CN" sz="3300" dirty="0" smtClean="0"/>
-                <a:t>then</a:t>
-              </a:r>
-              <a:r>
-                <a:rPr lang="en-US" altLang="zh-CN" sz="3300" dirty="0" smtClean="0"/>
-                <a:t> </a:t>
-              </a:r>
-              <a:r>
-                <a:rPr lang="en-US" altLang="zh-CN" sz="3300" dirty="0" smtClean="0"/>
-                <a:t>calculate the </a:t>
-              </a:r>
-              <a:r>
-                <a:rPr lang="en-US" altLang="zh-CN" sz="3300" dirty="0" smtClean="0"/>
-                <a:t>user’s </a:t>
-              </a:r>
-              <a:r>
-                <a:rPr lang="en-US" altLang="zh-CN" sz="3300" dirty="0" smtClean="0"/>
-                <a:t>head shape so that </a:t>
-              </a:r>
-              <a:r>
-                <a:rPr lang="en-US" altLang="zh-CN" sz="3300" dirty="0" smtClean="0"/>
-                <a:t>our app give recommended </a:t>
-              </a:r>
-              <a:r>
-                <a:rPr lang="en-US" altLang="zh-CN" sz="3300" dirty="0" smtClean="0"/>
-                <a:t>hairstyle according to </a:t>
-              </a:r>
-              <a:r>
-                <a:rPr lang="en-US" altLang="zh-CN" sz="3300" dirty="0" smtClean="0"/>
-                <a:t>their </a:t>
-              </a:r>
-              <a:r>
-                <a:rPr lang="en-US" altLang="zh-CN" sz="3300" dirty="0" smtClean="0"/>
-                <a:t>head shape.</a:t>
+                <a:t>of the app, then calculate the user’s head shape so that our app give recommended hairstyle according to their head shape.</a:t>
               </a:r>
               <a:endParaRPr lang="en-US" altLang="zh-CN" sz="3300" dirty="0"/>
             </a:p>
@@ -5468,8 +5386,8 @@
           </p:blipFill>
           <p:spPr>
             <a:xfrm>
-              <a:off x="29024630" y="15852566"/>
-              <a:ext cx="2188544" cy="2667886"/>
+              <a:off x="29024630" y="15852567"/>
+              <a:ext cx="2188544" cy="2441475"/>
             </a:xfrm>
             <a:prstGeom prst="rect">
               <a:avLst/>
@@ -5586,6 +5504,491 @@
               <a:t>Image</a:t>
             </a:r>
             <a:endParaRPr kumimoji="1" lang="zh-CN" altLang="en-US" dirty="0"/>
+          </a:p>
+        </p:txBody>
+      </p:sp>
+      <p:sp>
+        <p:nvSpPr>
+          <p:cNvPr id="4" name="矩形 3"/>
+          <p:cNvSpPr/>
+          <p:nvPr/>
+        </p:nvSpPr>
+        <p:spPr>
+          <a:xfrm>
+            <a:off x="580312" y="25725120"/>
+            <a:ext cx="21243368" cy="6727530"/>
+          </a:xfrm>
+          <a:prstGeom prst="rect">
+            <a:avLst/>
+          </a:prstGeom>
+          <a:solidFill>
+            <a:schemeClr val="accent1">
+              <a:alpha val="90000"/>
+            </a:schemeClr>
+          </a:solidFill>
+          <a:ln>
+            <a:noFill/>
+          </a:ln>
+        </p:spPr>
+        <p:style>
+          <a:lnRef idx="2">
+            <a:schemeClr val="accent1">
+              <a:shade val="50000"/>
+            </a:schemeClr>
+          </a:lnRef>
+          <a:fillRef idx="1">
+            <a:schemeClr val="accent1"/>
+          </a:fillRef>
+          <a:effectRef idx="0">
+            <a:schemeClr val="accent1"/>
+          </a:effectRef>
+          <a:fontRef idx="minor">
+            <a:schemeClr val="lt1"/>
+          </a:fontRef>
+        </p:style>
+        <p:txBody>
+          <a:bodyPr rtlCol="0" anchor="ctr"/>
+          <a:lstStyle/>
+          <a:p>
+            <a:pPr algn="ctr"/>
+            <a:endParaRPr kumimoji="1" lang="zh-CN" altLang="en-US"/>
+          </a:p>
+        </p:txBody>
+      </p:sp>
+      <p:sp>
+        <p:nvSpPr>
+          <p:cNvPr id="56" name="矩形 55"/>
+          <p:cNvSpPr/>
+          <p:nvPr/>
+        </p:nvSpPr>
+        <p:spPr>
+          <a:xfrm>
+            <a:off x="22006560" y="25725120"/>
+            <a:ext cx="21230559" cy="6727530"/>
+          </a:xfrm>
+          <a:prstGeom prst="rect">
+            <a:avLst/>
+          </a:prstGeom>
+          <a:solidFill>
+            <a:schemeClr val="accent1">
+              <a:alpha val="90000"/>
+            </a:schemeClr>
+          </a:solidFill>
+          <a:ln>
+            <a:noFill/>
+          </a:ln>
+        </p:spPr>
+        <p:style>
+          <a:lnRef idx="2">
+            <a:schemeClr val="accent1">
+              <a:shade val="50000"/>
+            </a:schemeClr>
+          </a:lnRef>
+          <a:fillRef idx="1">
+            <a:schemeClr val="accent1"/>
+          </a:fillRef>
+          <a:effectRef idx="0">
+            <a:schemeClr val="accent1"/>
+          </a:effectRef>
+          <a:fontRef idx="minor">
+            <a:schemeClr val="lt1"/>
+          </a:fontRef>
+        </p:style>
+        <p:txBody>
+          <a:bodyPr rtlCol="0" anchor="ctr"/>
+          <a:lstStyle/>
+          <a:p>
+            <a:pPr algn="ctr"/>
+            <a:endParaRPr kumimoji="1" lang="zh-CN" altLang="en-US"/>
+          </a:p>
+        </p:txBody>
+      </p:sp>
+      <p:sp>
+        <p:nvSpPr>
+          <p:cNvPr id="57" name="矩形 56"/>
+          <p:cNvSpPr/>
+          <p:nvPr/>
+        </p:nvSpPr>
+        <p:spPr>
+          <a:xfrm>
+            <a:off x="7337510" y="26036628"/>
+            <a:ext cx="5887571" cy="1177892"/>
+          </a:xfrm>
+          <a:prstGeom prst="rect">
+            <a:avLst/>
+          </a:prstGeom>
+          <a:solidFill>
+            <a:srgbClr val="1F3864"/>
+          </a:solidFill>
+          <a:ln>
+            <a:noFill/>
+          </a:ln>
+        </p:spPr>
+        <p:style>
+          <a:lnRef idx="2">
+            <a:schemeClr val="accent1">
+              <a:shade val="50000"/>
+            </a:schemeClr>
+          </a:lnRef>
+          <a:fillRef idx="1">
+            <a:schemeClr val="accent1"/>
+          </a:fillRef>
+          <a:effectRef idx="0">
+            <a:schemeClr val="accent1"/>
+          </a:effectRef>
+          <a:fontRef idx="minor">
+            <a:schemeClr val="lt1"/>
+          </a:fontRef>
+        </p:style>
+        <p:txBody>
+          <a:bodyPr rtlCol="0" anchor="ctr"/>
+          <a:lstStyle/>
+          <a:p>
+            <a:pPr algn="ctr"/>
+            <a:r>
+              <a:rPr kumimoji="1" lang="en-US" altLang="zh-CN" dirty="0" smtClean="0"/>
+              <a:t>User</a:t>
+            </a:r>
+            <a:r>
+              <a:rPr kumimoji="1" lang="zh-CN" altLang="en-US" dirty="0" smtClean="0"/>
+              <a:t> </a:t>
+            </a:r>
+            <a:r>
+              <a:rPr kumimoji="1" lang="en-US" altLang="zh-CN" dirty="0" smtClean="0"/>
+              <a:t>Stories</a:t>
+            </a:r>
+            <a:endParaRPr kumimoji="1" lang="zh-CN" altLang="en-US" dirty="0"/>
+          </a:p>
+        </p:txBody>
+      </p:sp>
+      <p:sp>
+        <p:nvSpPr>
+          <p:cNvPr id="58" name="矩形 57"/>
+          <p:cNvSpPr/>
+          <p:nvPr/>
+        </p:nvSpPr>
+        <p:spPr>
+          <a:xfrm>
+            <a:off x="31584096" y="26036628"/>
+            <a:ext cx="5887571" cy="1177892"/>
+          </a:xfrm>
+          <a:prstGeom prst="rect">
+            <a:avLst/>
+          </a:prstGeom>
+          <a:solidFill>
+            <a:srgbClr val="1F3864"/>
+          </a:solidFill>
+          <a:ln>
+            <a:noFill/>
+          </a:ln>
+        </p:spPr>
+        <p:style>
+          <a:lnRef idx="2">
+            <a:schemeClr val="accent1">
+              <a:shade val="50000"/>
+            </a:schemeClr>
+          </a:lnRef>
+          <a:fillRef idx="1">
+            <a:schemeClr val="accent1"/>
+          </a:fillRef>
+          <a:effectRef idx="0">
+            <a:schemeClr val="accent1"/>
+          </a:effectRef>
+          <a:fontRef idx="minor">
+            <a:schemeClr val="lt1"/>
+          </a:fontRef>
+        </p:style>
+        <p:txBody>
+          <a:bodyPr rtlCol="0" anchor="ctr"/>
+          <a:lstStyle/>
+          <a:p>
+            <a:pPr algn="ctr"/>
+            <a:r>
+              <a:rPr kumimoji="1" lang="en-US" altLang="zh-CN" dirty="0" smtClean="0"/>
+              <a:t>Accomplishments</a:t>
+            </a:r>
+            <a:endParaRPr kumimoji="1" lang="zh-CN" altLang="en-US" dirty="0"/>
+          </a:p>
+        </p:txBody>
+      </p:sp>
+      <p:sp>
+        <p:nvSpPr>
+          <p:cNvPr id="60" name="文本框 59"/>
+          <p:cNvSpPr txBox="1"/>
+          <p:nvPr/>
+        </p:nvSpPr>
+        <p:spPr>
+          <a:xfrm>
+            <a:off x="817576" y="27475946"/>
+            <a:ext cx="21188983" cy="4505721"/>
+          </a:xfrm>
+          <a:prstGeom prst="rect">
+            <a:avLst/>
+          </a:prstGeom>
+          <a:noFill/>
+        </p:spPr>
+        <p:txBody>
+          <a:bodyPr wrap="square" rtlCol="0">
+            <a:spAutoFit/>
+          </a:bodyPr>
+          <a:lstStyle/>
+          <a:p>
+            <a:pPr marL="857250" indent="-857250">
+              <a:buFont typeface="Arial" charset="0"/>
+              <a:buChar char="•"/>
+            </a:pPr>
+            <a:r>
+              <a:rPr lang="en-US" altLang="zh-CN" dirty="0">
+                <a:solidFill>
+                  <a:schemeClr val="bg1"/>
+                </a:solidFill>
+              </a:rPr>
+              <a:t>I, user, want to create an account via social media or email address.</a:t>
+            </a:r>
+          </a:p>
+          <a:p>
+            <a:pPr marL="857250" indent="-857250">
+              <a:buFont typeface="Arial" charset="0"/>
+              <a:buChar char="•"/>
+            </a:pPr>
+            <a:r>
+              <a:rPr lang="en-US" altLang="zh-CN" dirty="0">
+                <a:solidFill>
+                  <a:schemeClr val="bg1"/>
+                </a:solidFill>
+              </a:rPr>
+              <a:t>I, user, want to take photos and send them into the software</a:t>
+            </a:r>
+            <a:r>
+              <a:rPr lang="en-US" altLang="zh-CN" dirty="0" smtClean="0">
+                <a:solidFill>
+                  <a:schemeClr val="bg1"/>
+                </a:solidFill>
+              </a:rPr>
+              <a:t>.</a:t>
+            </a:r>
+          </a:p>
+          <a:p>
+            <a:pPr marL="857250" indent="-857250">
+              <a:buFont typeface="Arial" charset="0"/>
+              <a:buChar char="•"/>
+            </a:pPr>
+            <a:r>
+              <a:rPr lang="en-US" altLang="zh-CN" dirty="0" smtClean="0">
+                <a:solidFill>
+                  <a:schemeClr val="bg1"/>
+                </a:solidFill>
+              </a:rPr>
+              <a:t>I</a:t>
+            </a:r>
+            <a:r>
+              <a:rPr lang="en-US" altLang="zh-CN" dirty="0">
+                <a:solidFill>
+                  <a:schemeClr val="bg1"/>
+                </a:solidFill>
+              </a:rPr>
+              <a:t>, user, want to save pictures into my phone</a:t>
+            </a:r>
+            <a:r>
+              <a:rPr lang="en-US" altLang="zh-CN" dirty="0" smtClean="0">
+                <a:solidFill>
+                  <a:schemeClr val="bg1"/>
+                </a:solidFill>
+              </a:rPr>
+              <a:t>.</a:t>
+            </a:r>
+          </a:p>
+          <a:p>
+            <a:pPr marL="857250" indent="-857250">
+              <a:buFont typeface="Arial" charset="0"/>
+              <a:buChar char="•"/>
+            </a:pPr>
+            <a:r>
+              <a:rPr kumimoji="1" lang="en-US" altLang="zh-CN" dirty="0">
+                <a:solidFill>
+                  <a:schemeClr val="bg1"/>
+                </a:solidFill>
+              </a:rPr>
+              <a:t>I, user, want to hear suggestions from the </a:t>
+            </a:r>
+            <a:r>
+              <a:rPr kumimoji="1" lang="en-US" altLang="zh-CN" dirty="0" smtClean="0">
+                <a:solidFill>
+                  <a:schemeClr val="bg1"/>
+                </a:solidFill>
+              </a:rPr>
+              <a:t>App.</a:t>
+            </a:r>
+          </a:p>
+          <a:p>
+            <a:pPr marL="857250" indent="-857250">
+              <a:buFont typeface="Arial" charset="0"/>
+              <a:buChar char="•"/>
+            </a:pPr>
+            <a:r>
+              <a:rPr kumimoji="1" lang="en-US" altLang="zh-CN" dirty="0">
+                <a:solidFill>
+                  <a:schemeClr val="bg1"/>
+                </a:solidFill>
+              </a:rPr>
+              <a:t>I, user, want to share my favorite picture </a:t>
+            </a:r>
+            <a:r>
+              <a:rPr kumimoji="1" lang="en-US" altLang="zh-CN" dirty="0" smtClean="0">
+                <a:solidFill>
+                  <a:schemeClr val="bg1"/>
+                </a:solidFill>
+              </a:rPr>
+              <a:t>to </a:t>
+            </a:r>
+            <a:r>
+              <a:rPr kumimoji="1" lang="en-US" altLang="zh-CN" dirty="0">
+                <a:solidFill>
+                  <a:schemeClr val="bg1"/>
+                </a:solidFill>
+              </a:rPr>
+              <a:t>social networks.</a:t>
+            </a:r>
+            <a:endParaRPr kumimoji="1" lang="zh-CN" altLang="en-US" dirty="0">
+              <a:solidFill>
+                <a:schemeClr val="bg1"/>
+              </a:solidFill>
+            </a:endParaRPr>
+          </a:p>
+        </p:txBody>
+      </p:sp>
+      <p:sp>
+        <p:nvSpPr>
+          <p:cNvPr id="61" name="文本框 60"/>
+          <p:cNvSpPr txBox="1"/>
+          <p:nvPr/>
+        </p:nvSpPr>
+        <p:spPr>
+          <a:xfrm>
+            <a:off x="22231016" y="27580724"/>
+            <a:ext cx="21188983" cy="4505721"/>
+          </a:xfrm>
+          <a:prstGeom prst="rect">
+            <a:avLst/>
+          </a:prstGeom>
+          <a:noFill/>
+        </p:spPr>
+        <p:txBody>
+          <a:bodyPr wrap="square" rtlCol="0">
+            <a:spAutoFit/>
+          </a:bodyPr>
+          <a:lstStyle/>
+          <a:p>
+            <a:pPr marL="857250" indent="-857250">
+              <a:buFont typeface="Arial" charset="0"/>
+              <a:buChar char="•"/>
+            </a:pPr>
+            <a:r>
+              <a:rPr lang="en-US" altLang="zh-CN" dirty="0" smtClean="0">
+                <a:solidFill>
+                  <a:schemeClr val="bg1"/>
+                </a:solidFill>
+              </a:rPr>
+              <a:t>The user can </a:t>
+            </a:r>
+            <a:r>
+              <a:rPr lang="en-US" altLang="zh-CN" dirty="0">
+                <a:solidFill>
+                  <a:schemeClr val="bg1"/>
+                </a:solidFill>
+              </a:rPr>
+              <a:t>create an account via </a:t>
+            </a:r>
+            <a:r>
+              <a:rPr lang="en-US" altLang="zh-CN" dirty="0" smtClean="0">
+                <a:solidFill>
+                  <a:schemeClr val="bg1"/>
+                </a:solidFill>
+              </a:rPr>
+              <a:t>email address then log in.</a:t>
+            </a:r>
+            <a:endParaRPr lang="en-US" altLang="zh-CN" dirty="0">
+              <a:solidFill>
+                <a:schemeClr val="bg1"/>
+              </a:solidFill>
+            </a:endParaRPr>
+          </a:p>
+          <a:p>
+            <a:pPr marL="857250" indent="-857250">
+              <a:buFont typeface="Arial" charset="0"/>
+              <a:buChar char="•"/>
+            </a:pPr>
+            <a:r>
+              <a:rPr lang="en-US" altLang="zh-CN" dirty="0" smtClean="0">
+                <a:solidFill>
+                  <a:schemeClr val="bg1"/>
+                </a:solidFill>
+              </a:rPr>
+              <a:t>The user can send photo from the album to the App.</a:t>
+            </a:r>
+          </a:p>
+          <a:p>
+            <a:pPr marL="857250" indent="-857250">
+              <a:buFont typeface="Arial" charset="0"/>
+              <a:buChar char="•"/>
+            </a:pPr>
+            <a:r>
+              <a:rPr lang="en-US" altLang="zh-CN" dirty="0" smtClean="0">
+                <a:solidFill>
+                  <a:schemeClr val="bg1"/>
+                </a:solidFill>
+              </a:rPr>
+              <a:t>The</a:t>
+            </a:r>
+            <a:r>
+              <a:rPr lang="zh-CN" altLang="en-US" dirty="0" smtClean="0">
+                <a:solidFill>
+                  <a:schemeClr val="bg1"/>
+                </a:solidFill>
+              </a:rPr>
+              <a:t> </a:t>
+            </a:r>
+            <a:r>
+              <a:rPr lang="en-US" altLang="zh-CN" dirty="0" smtClean="0">
+                <a:solidFill>
+                  <a:schemeClr val="bg1"/>
+                </a:solidFill>
+              </a:rPr>
+              <a:t>user can save picture with changed hairstyle into album.</a:t>
+            </a:r>
+          </a:p>
+          <a:p>
+            <a:pPr marL="857250" indent="-857250">
+              <a:buFont typeface="Arial" charset="0"/>
+              <a:buChar char="•"/>
+            </a:pPr>
+            <a:r>
+              <a:rPr kumimoji="1" lang="en-US" altLang="zh-CN" dirty="0" smtClean="0">
+                <a:solidFill>
+                  <a:schemeClr val="bg1"/>
+                </a:solidFill>
+              </a:rPr>
+              <a:t>The user can get suggested hairstyle according to the head shape.</a:t>
+            </a:r>
+          </a:p>
+          <a:p>
+            <a:pPr marL="857250" indent="-857250">
+              <a:buFont typeface="Arial" charset="0"/>
+              <a:buChar char="•"/>
+            </a:pPr>
+            <a:r>
+              <a:rPr kumimoji="1" lang="en-US" altLang="zh-CN" dirty="0" smtClean="0">
+                <a:solidFill>
+                  <a:schemeClr val="bg1"/>
+                </a:solidFill>
+              </a:rPr>
+              <a:t>The user can choose hairstyles on the table view.</a:t>
+            </a:r>
+            <a:endParaRPr kumimoji="1" lang="zh-CN" altLang="en-US" dirty="0">
+              <a:solidFill>
+                <a:schemeClr val="bg1"/>
+              </a:solidFill>
+            </a:endParaRPr>
           </a:p>
         </p:txBody>
       </p:sp>

</xml_diff>

<commit_message>
Change the picture in Recommendation part
</commit_message>
<xml_diff>
--- a/Hair Style Simulation Poster.pptx
+++ b/Hair Style Simulation Poster.pptx
@@ -3562,7 +3562,7 @@
         </p:nvSpPr>
         <p:spPr>
           <a:xfrm>
-            <a:off x="35488737" y="1241638"/>
+            <a:off x="35488737" y="1213929"/>
             <a:ext cx="5334000" cy="2361864"/>
           </a:xfrm>
           <a:prstGeom prst="rect">
@@ -4183,8 +4183,8 @@
         </p:blipFill>
         <p:spPr>
           <a:xfrm>
-            <a:off x="8726600" y="19535475"/>
-            <a:ext cx="2973362" cy="5745519"/>
+            <a:off x="8726600" y="19538879"/>
+            <a:ext cx="2973362" cy="5738711"/>
           </a:xfrm>
           <a:prstGeom prst="rect">
             <a:avLst/>
@@ -4309,8 +4309,8 @@
         </p:blipFill>
         <p:spPr>
           <a:xfrm>
-            <a:off x="33041201" y="19551056"/>
-            <a:ext cx="2973362" cy="5745519"/>
+            <a:off x="33041201" y="19554460"/>
+            <a:ext cx="2973362" cy="5738711"/>
           </a:xfrm>
           <a:prstGeom prst="rect">
             <a:avLst/>
@@ -4403,7 +4403,7 @@
         <p:spPr>
           <a:xfrm>
             <a:off x="36265119" y="21051228"/>
-            <a:ext cx="8040914" cy="1857688"/>
+            <a:ext cx="8040914" cy="2740366"/>
           </a:xfrm>
           <a:prstGeom prst="rect">
             <a:avLst/>
@@ -4466,6 +4466,17 @@
               <a:rPr lang="en-US" altLang="zh-CN" dirty="0" smtClean="0"/>
               <a:t>now</a:t>
             </a:r>
+          </a:p>
+          <a:p>
+            <a:pPr marL="857250" indent="-857250">
+              <a:buFont typeface="Arial" charset="0"/>
+              <a:buChar char="•"/>
+            </a:pPr>
+            <a:r>
+              <a:rPr lang="en-US" altLang="zh-CN" dirty="0" smtClean="0"/>
+              <a:t>More will be uploaded</a:t>
+            </a:r>
+            <a:endParaRPr lang="en-US" altLang="zh-CN" dirty="0" smtClean="0"/>
           </a:p>
         </p:txBody>
       </p:sp>
@@ -4539,8 +4550,8 @@
         </p:blipFill>
         <p:spPr>
           <a:xfrm>
-            <a:off x="33079386" y="12620500"/>
-            <a:ext cx="2974944" cy="5748577"/>
+            <a:off x="33079386" y="12623906"/>
+            <a:ext cx="2974944" cy="5741764"/>
           </a:xfrm>
           <a:prstGeom prst="rect">
             <a:avLst/>
@@ -4725,8 +4736,8 @@
         </p:blipFill>
         <p:spPr>
           <a:xfrm>
-            <a:off x="33099832" y="5586297"/>
-            <a:ext cx="3028583" cy="5852224"/>
+            <a:off x="33099832" y="5589764"/>
+            <a:ext cx="3028583" cy="5845289"/>
           </a:xfrm>
           <a:prstGeom prst="rect">
             <a:avLst/>
@@ -5440,31 +5451,7 @@
               </a:r>
               <a:r>
                 <a:rPr lang="en-US" altLang="zh-CN" sz="3300" dirty="0" smtClean="0"/>
-                <a:t>of the app, then calculate the user’s </a:t>
-              </a:r>
-              <a:r>
-                <a:rPr lang="en-US" altLang="zh-CN" sz="3300" dirty="0" smtClean="0"/>
-                <a:t>face</a:t>
-              </a:r>
-              <a:r>
-                <a:rPr lang="en-US" altLang="zh-CN" sz="3300" dirty="0" smtClean="0"/>
-                <a:t> </a:t>
-              </a:r>
-              <a:r>
-                <a:rPr lang="en-US" altLang="zh-CN" sz="3300" dirty="0" smtClean="0"/>
-                <a:t>shape so that our app give recommended hairstyle according to their </a:t>
-              </a:r>
-              <a:r>
-                <a:rPr lang="en-US" altLang="zh-CN" sz="3300" dirty="0" smtClean="0"/>
-                <a:t>face</a:t>
-              </a:r>
-              <a:r>
-                <a:rPr lang="en-US" altLang="zh-CN" sz="3300" dirty="0" smtClean="0"/>
-                <a:t> </a:t>
-              </a:r>
-              <a:r>
-                <a:rPr lang="en-US" altLang="zh-CN" sz="3300" dirty="0" smtClean="0"/>
-                <a:t>shape.</a:t>
+                <a:t>of the app, then calculate the user’s face shape so that our app give recommended hairstyle according to their face shape.</a:t>
               </a:r>
               <a:endParaRPr lang="en-US" altLang="zh-CN" sz="3300" dirty="0"/>
             </a:p>
@@ -5881,21 +5868,8 @@
                   <a:schemeClr val="bg1"/>
                 </a:solidFill>
               </a:rPr>
-              <a:t>face</a:t>
-            </a:r>
-            <a:r>
-              <a:rPr lang="en-US" altLang="zh-CN" dirty="0" smtClean="0">
-                <a:solidFill>
-                  <a:schemeClr val="bg1"/>
-                </a:solidFill>
-              </a:rPr>
-              <a:t>.</a:t>
-            </a:r>
-            <a:endParaRPr lang="en-US" altLang="zh-CN" dirty="0" smtClean="0">
-              <a:solidFill>
-                <a:schemeClr val="bg1"/>
-              </a:solidFill>
-            </a:endParaRPr>
+              <a:t>face.</a:t>
+            </a:r>
           </a:p>
           <a:p>
             <a:pPr marL="857250" indent="-857250">
@@ -6052,15 +6026,7 @@
                   <a:schemeClr val="bg1"/>
                 </a:solidFill>
               </a:rPr>
-              <a:t>email address then log in</a:t>
-            </a:r>
-            <a:r>
-              <a:rPr lang="en-US" altLang="zh-CN" dirty="0" smtClean="0">
-                <a:solidFill>
-                  <a:schemeClr val="bg1"/>
-                </a:solidFill>
-              </a:rPr>
-              <a:t>.</a:t>
+              <a:t>email address then log in.</a:t>
             </a:r>
           </a:p>
           <a:p>
@@ -6285,7 +6251,15 @@
                   <a:schemeClr val="bg1"/>
                 </a:solidFill>
               </a:rPr>
-              <a:t>user can </a:t>
+              <a:t>user can try</a:t>
+            </a:r>
+            <a:r>
+              <a:rPr lang="zh-CN" altLang="en-US" dirty="0" smtClean="0">
+                <a:solidFill>
+                  <a:schemeClr val="bg1"/>
+                </a:solidFill>
+              </a:rPr>
+              <a:t> </a:t>
             </a:r>
             <a:r>
               <a:rPr lang="en-US" altLang="zh-CN" dirty="0" smtClean="0">
@@ -6293,7 +6267,7 @@
                   <a:schemeClr val="bg1"/>
                 </a:solidFill>
               </a:rPr>
-              <a:t>try</a:t>
+              <a:t>new</a:t>
             </a:r>
             <a:r>
               <a:rPr lang="zh-CN" altLang="en-US" dirty="0" smtClean="0">
@@ -6309,7 +6283,7 @@
                   <a:schemeClr val="bg1"/>
                 </a:solidFill>
               </a:rPr>
-              <a:t>new</a:t>
+              <a:t>hairstyles</a:t>
             </a:r>
             <a:r>
               <a:rPr lang="zh-CN" altLang="en-US" dirty="0" smtClean="0">
@@ -6325,7 +6299,7 @@
                   <a:schemeClr val="bg1"/>
                 </a:solidFill>
               </a:rPr>
-              <a:t>hairstyles</a:t>
+              <a:t>in</a:t>
             </a:r>
             <a:r>
               <a:rPr lang="zh-CN" altLang="en-US" dirty="0" smtClean="0">
@@ -6341,7 +6315,7 @@
                   <a:schemeClr val="bg1"/>
                 </a:solidFill>
               </a:rPr>
-              <a:t>in</a:t>
+              <a:t>the</a:t>
             </a:r>
             <a:r>
               <a:rPr lang="zh-CN" altLang="en-US" dirty="0" smtClean="0">
@@ -6357,7 +6331,7 @@
                   <a:schemeClr val="bg1"/>
                 </a:solidFill>
               </a:rPr>
-              <a:t>the</a:t>
+              <a:t>table</a:t>
             </a:r>
             <a:r>
               <a:rPr lang="zh-CN" altLang="en-US" dirty="0" smtClean="0">
@@ -6373,29 +6347,8 @@
                   <a:schemeClr val="bg1"/>
                 </a:solidFill>
               </a:rPr>
-              <a:t>table</a:t>
-            </a:r>
-            <a:r>
-              <a:rPr lang="zh-CN" altLang="en-US" dirty="0" smtClean="0">
-                <a:solidFill>
-                  <a:schemeClr val="bg1"/>
-                </a:solidFill>
-              </a:rPr>
-              <a:t> </a:t>
-            </a:r>
-            <a:r>
-              <a:rPr lang="en-US" altLang="zh-CN" dirty="0" smtClean="0">
-                <a:solidFill>
-                  <a:schemeClr val="bg1"/>
-                </a:solidFill>
-              </a:rPr>
               <a:t>view.</a:t>
             </a:r>
-            <a:endParaRPr lang="en-US" altLang="zh-CN" dirty="0" smtClean="0">
-              <a:solidFill>
-                <a:schemeClr val="bg1"/>
-              </a:solidFill>
-            </a:endParaRPr>
           </a:p>
           <a:p>
             <a:pPr marL="857250" indent="-857250">
@@ -6408,39 +6361,7 @@
                   <a:schemeClr val="bg1"/>
                 </a:solidFill>
               </a:rPr>
-              <a:t>The user can get </a:t>
-            </a:r>
-            <a:r>
-              <a:rPr kumimoji="1" lang="en-US" altLang="zh-CN" dirty="0" smtClean="0">
-                <a:solidFill>
-                  <a:schemeClr val="bg1"/>
-                </a:solidFill>
-              </a:rPr>
-              <a:t>suggested </a:t>
-            </a:r>
-            <a:r>
-              <a:rPr kumimoji="1" lang="en-US" altLang="zh-CN" dirty="0" smtClean="0">
-                <a:solidFill>
-                  <a:schemeClr val="bg1"/>
-                </a:solidFill>
-              </a:rPr>
-              <a:t>hairstyle according to </a:t>
-            </a:r>
-            <a:r>
-              <a:rPr kumimoji="1" lang="en-US" altLang="zh-CN" dirty="0" smtClean="0">
-                <a:solidFill>
-                  <a:schemeClr val="bg1"/>
-                </a:solidFill>
-              </a:rPr>
-              <a:t>their face </a:t>
-            </a:r>
-            <a:r>
-              <a:rPr kumimoji="1" lang="en-US" altLang="zh-CN" dirty="0" smtClean="0">
-                <a:solidFill>
-                  <a:schemeClr val="bg1"/>
-                </a:solidFill>
-              </a:rPr>
-              <a:t>shape.</a:t>
+              <a:t>The user can get suggested hairstyle according to their face shape.</a:t>
             </a:r>
           </a:p>
           <a:p>
@@ -6518,15 +6439,7 @@
                   <a:schemeClr val="bg1"/>
                 </a:solidFill>
               </a:rPr>
-              <a:t>the</a:t>
-            </a:r>
-            <a:r>
-              <a:rPr kumimoji="1" lang="en-US" altLang="zh-CN" dirty="0" smtClean="0">
-                <a:solidFill>
-                  <a:schemeClr val="bg1"/>
-                </a:solidFill>
-              </a:rPr>
-              <a:t>ir</a:t>
+              <a:t>their</a:t>
             </a:r>
             <a:r>
               <a:rPr kumimoji="1" lang="zh-CN" altLang="en-US" dirty="0" smtClean="0">

</xml_diff>